<commit_message>
Adding a copy of the objectives to the end
</commit_message>
<xml_diff>
--- a/murach_html_4e/slides/Chapter 2 slides.pptx
+++ b/murach_html_4e/slides/Chapter 2 slides.pptx
@@ -5,10 +5,10 @@
     <p:sldMasterId id="2147483673" r:id="rId1"/>
   </p:sldMasterIdLst>
   <p:notesMasterIdLst>
-    <p:notesMasterId r:id="rId33"/>
+    <p:notesMasterId r:id="rId35"/>
   </p:notesMasterIdLst>
   <p:handoutMasterIdLst>
-    <p:handoutMasterId r:id="rId34"/>
+    <p:handoutMasterId r:id="rId36"/>
   </p:handoutMasterIdLst>
   <p:sldIdLst>
     <p:sldId id="256" r:id="rId2"/>
@@ -42,6 +42,8 @@
     <p:sldId id="284" r:id="rId30"/>
     <p:sldId id="285" r:id="rId31"/>
     <p:sldId id="286" r:id="rId32"/>
+    <p:sldId id="287" r:id="rId33"/>
+    <p:sldId id="288" r:id="rId34"/>
   </p:sldIdLst>
   <p:sldSz cx="9144000" cy="6858000" type="screen4x3"/>
   <p:notesSz cx="7010400" cy="9296400"/>
@@ -360,7 +362,7 @@
               <a:pPr>
                 <a:defRPr/>
               </a:pPr>
-              <a:t>3/2/2018</a:t>
+              <a:t>6/4/2019</a:t>
             </a:fld>
             <a:endParaRPr lang="en-US"/>
           </a:p>
@@ -1036,7 +1038,7 @@
               <a:defRPr/>
             </a:pPr>
             <a:r>
-              <a:rPr lang="en-US" smtClean="0"/>
+              <a:rPr lang="en-US"/>
               <a:t>Murach's HTML and CSS, 4th Edition</a:t>
             </a:r>
             <a:endParaRPr lang="en-US" dirty="0"/>
@@ -1069,14 +1071,14 @@
             <a:pPr>
               <a:defRPr/>
             </a:pPr>
-            <a:endParaRPr lang="en-US" smtClean="0"/>
-          </a:p>
-          <a:p>
-            <a:pPr>
-              <a:defRPr/>
-            </a:pPr>
-            <a:r>
-              <a:rPr lang="en-US" smtClean="0">
+            <a:endParaRPr lang="en-US"/>
+          </a:p>
+          <a:p>
+            <a:pPr>
+              <a:defRPr/>
+            </a:pPr>
+            <a:r>
+              <a:rPr lang="en-US">
                 <a:solidFill>
                   <a:schemeClr val="bg1"/>
                 </a:solidFill>
@@ -1160,10 +1162,10 @@
           <a:p>
             <a:pPr lvl="0"/>
             <a:r>
-              <a:rPr lang="en-US" smtClean="0"/>
+              <a:rPr lang="en-US"/>
               <a:t>Click to edit Master title style</a:t>
             </a:r>
-            <a:endParaRPr lang="en-US" dirty="0" smtClean="0"/>
+            <a:endParaRPr lang="en-US" dirty="0"/>
           </a:p>
         </p:txBody>
       </p:sp>
@@ -1210,7 +1212,7 @@
           <a:p>
             <a:pPr lvl="0"/>
             <a:r>
-              <a:rPr lang="en-US" smtClean="0"/>
+              <a:rPr lang="en-US"/>
               <a:t>Click to edit Master text styles</a:t>
             </a:r>
           </a:p>
@@ -1241,7 +1243,7 @@
               <a:defRPr/>
             </a:pPr>
             <a:r>
-              <a:rPr lang="en-US" smtClean="0"/>
+              <a:rPr lang="en-US"/>
               <a:t>© 2018, Mike Murach &amp; Associates, Inc.</a:t>
             </a:r>
             <a:endParaRPr lang="en-US" dirty="0"/>
@@ -1280,10 +1282,9 @@
           <a:p>
             <a:pPr lvl="0"/>
             <a:r>
-              <a:rPr lang="en-US" dirty="0" smtClean="0"/>
+              <a:rPr lang="en-US" dirty="0"/>
               <a:t>Click to edit Master heading style</a:t>
             </a:r>
-            <a:endParaRPr lang="en-US" dirty="0"/>
           </a:p>
         </p:txBody>
       </p:sp>
@@ -1314,7 +1315,7 @@
           <a:p>
             <a:pPr lvl="0"/>
             <a:r>
-              <a:rPr lang="en-US" smtClean="0"/>
+              <a:rPr lang="en-US"/>
               <a:t>Click to edit Master text styles</a:t>
             </a:r>
           </a:p>
@@ -1376,7 +1377,7 @@
               <a:defRPr/>
             </a:pPr>
             <a:r>
-              <a:rPr lang="en-US" smtClean="0"/>
+              <a:rPr lang="en-US"/>
               <a:t>Murach's HTML and CSS, 4th Edition</a:t>
             </a:r>
             <a:endParaRPr lang="en-US" dirty="0"/>
@@ -1409,14 +1410,14 @@
             <a:pPr>
               <a:defRPr/>
             </a:pPr>
-            <a:endParaRPr lang="en-US" smtClean="0"/>
-          </a:p>
-          <a:p>
-            <a:pPr>
-              <a:defRPr/>
-            </a:pPr>
-            <a:r>
-              <a:rPr lang="en-US" smtClean="0">
+            <a:endParaRPr lang="en-US"/>
+          </a:p>
+          <a:p>
+            <a:pPr>
+              <a:defRPr/>
+            </a:pPr>
+            <a:r>
+              <a:rPr lang="en-US">
                 <a:solidFill>
                   <a:schemeClr val="bg1"/>
                 </a:solidFill>
@@ -1500,10 +1501,10 @@
           <a:p>
             <a:pPr lvl="0"/>
             <a:r>
-              <a:rPr lang="en-US" smtClean="0"/>
+              <a:rPr lang="en-US"/>
               <a:t>Click to edit Master title style</a:t>
             </a:r>
-            <a:endParaRPr lang="en-US" dirty="0" smtClean="0"/>
+            <a:endParaRPr lang="en-US" dirty="0"/>
           </a:p>
         </p:txBody>
       </p:sp>
@@ -1534,7 +1535,7 @@
           <a:p>
             <a:pPr lvl="0"/>
             <a:r>
-              <a:rPr lang="en-US" smtClean="0"/>
+              <a:rPr lang="en-US"/>
               <a:t>Click to edit Master text styles</a:t>
             </a:r>
           </a:p>
@@ -1565,7 +1566,7 @@
               <a:defRPr/>
             </a:pPr>
             <a:r>
-              <a:rPr lang="en-US" smtClean="0"/>
+              <a:rPr lang="en-US"/>
               <a:t>© 2018, Mike Murach &amp; Associates, Inc.</a:t>
             </a:r>
             <a:endParaRPr lang="en-US" dirty="0"/>
@@ -1604,10 +1605,9 @@
           <a:p>
             <a:pPr lvl="0"/>
             <a:r>
-              <a:rPr lang="en-US" dirty="0" smtClean="0"/>
+              <a:rPr lang="en-US" dirty="0"/>
               <a:t>Click to edit Master heading style</a:t>
             </a:r>
-            <a:endParaRPr lang="en-US" dirty="0"/>
           </a:p>
         </p:txBody>
       </p:sp>
@@ -1638,7 +1638,7 @@
           <a:p>
             <a:pPr lvl="0"/>
             <a:r>
-              <a:rPr lang="en-US" smtClean="0"/>
+              <a:rPr lang="en-US"/>
               <a:t>Click to edit Master text styles</a:t>
             </a:r>
           </a:p>
@@ -1700,7 +1700,7 @@
               <a:defRPr/>
             </a:pPr>
             <a:r>
-              <a:rPr lang="en-US" smtClean="0"/>
+              <a:rPr lang="en-US"/>
               <a:t>Murach's HTML and CSS, 4th Edition</a:t>
             </a:r>
             <a:endParaRPr lang="en-US" dirty="0"/>
@@ -1733,7 +1733,7 @@
             <a:pPr algn="r">
               <a:defRPr/>
             </a:pPr>
-            <a:endParaRPr lang="en-US" sz="900" dirty="0" smtClean="0">
+            <a:endParaRPr lang="en-US" sz="900" dirty="0">
               <a:latin typeface="Arial Narrow" panose="020B0606020202030204" pitchFamily="34" charset="0"/>
             </a:endParaRPr>
           </a:p>
@@ -1742,7 +1742,7 @@
               <a:defRPr/>
             </a:pPr>
             <a:r>
-              <a:rPr lang="en-US" dirty="0" smtClean="0">
+              <a:rPr lang="en-US" dirty="0">
                 <a:solidFill>
                   <a:schemeClr val="bg1"/>
                 </a:solidFill>
@@ -1826,10 +1826,10 @@
           <a:p>
             <a:pPr lvl="0"/>
             <a:r>
-              <a:rPr lang="en-US" smtClean="0"/>
+              <a:rPr lang="en-US"/>
               <a:t>Click to edit Master title style</a:t>
             </a:r>
-            <a:endParaRPr lang="en-US" dirty="0" smtClean="0"/>
+            <a:endParaRPr lang="en-US" dirty="0"/>
           </a:p>
         </p:txBody>
       </p:sp>
@@ -1860,7 +1860,7 @@
           <a:p>
             <a:pPr lvl="0"/>
             <a:r>
-              <a:rPr lang="en-US" smtClean="0"/>
+              <a:rPr lang="en-US"/>
               <a:t>Click to edit Master text styles</a:t>
             </a:r>
           </a:p>
@@ -1891,7 +1891,7 @@
               <a:defRPr/>
             </a:pPr>
             <a:r>
-              <a:rPr lang="en-US" smtClean="0"/>
+              <a:rPr lang="en-US"/>
               <a:t>© 2018, Mike Murach &amp; Associates, Inc.</a:t>
             </a:r>
             <a:endParaRPr lang="en-US" dirty="0"/>
@@ -1930,11 +1930,11 @@
           <a:p>
             <a:pPr lvl="0"/>
             <a:r>
-              <a:rPr lang="en-US" dirty="0" smtClean="0"/>
+              <a:rPr lang="en-US" dirty="0"/>
               <a:t>Click to edit </a:t>
             </a:r>
             <a:r>
-              <a:rPr lang="en-US" smtClean="0"/>
+              <a:rPr lang="en-US"/>
               <a:t>Master heading style</a:t>
             </a:r>
             <a:endParaRPr lang="en-US" dirty="0"/>
@@ -1968,7 +1968,7 @@
           <a:p>
             <a:pPr lvl="0"/>
             <a:r>
-              <a:rPr lang="en-US" smtClean="0"/>
+              <a:rPr lang="en-US"/>
               <a:t>Click to edit Master text styles</a:t>
             </a:r>
           </a:p>
@@ -2043,7 +2043,7 @@
           <p:cNvPr id="6" name="Title 5">
             <a:extLst>
               <a:ext uri="{FF2B5EF4-FFF2-40B4-BE49-F238E27FC236}">
-                <a16:creationId xmlns="" xmlns:a16="http://schemas.microsoft.com/office/drawing/2014/main" id="{EC3A72EA-95A4-4971-A611-08118360D51D}"/>
+                <a16:creationId xmlns:a16="http://schemas.microsoft.com/office/drawing/2014/main" id="{EC3A72EA-95A4-4971-A611-08118360D51D}"/>
               </a:ext>
             </a:extLst>
           </p:cNvPr>
@@ -2071,7 +2071,7 @@
           <p:cNvPr id="2" name="Date Placeholder 1">
             <a:extLst>
               <a:ext uri="{FF2B5EF4-FFF2-40B4-BE49-F238E27FC236}">
-                <a16:creationId xmlns="" xmlns:a16="http://schemas.microsoft.com/office/drawing/2014/main" id="{805C1F24-BFF2-4185-85BB-A0DFC365FCD9}"/>
+                <a16:creationId xmlns:a16="http://schemas.microsoft.com/office/drawing/2014/main" id="{805C1F24-BFF2-4185-85BB-A0DFC365FCD9}"/>
               </a:ext>
             </a:extLst>
           </p:cNvPr>
@@ -2103,7 +2103,7 @@
           <p:cNvPr id="3" name="Footer Placeholder 2">
             <a:extLst>
               <a:ext uri="{FF2B5EF4-FFF2-40B4-BE49-F238E27FC236}">
-                <a16:creationId xmlns="" xmlns:a16="http://schemas.microsoft.com/office/drawing/2014/main" id="{9D0D137B-59BC-486D-BF00-F2FFE59AC0D5}"/>
+                <a16:creationId xmlns:a16="http://schemas.microsoft.com/office/drawing/2014/main" id="{9D0D137B-59BC-486D-BF00-F2FFE59AC0D5}"/>
               </a:ext>
             </a:extLst>
           </p:cNvPr>
@@ -2135,7 +2135,7 @@
           <p:cNvPr id="4" name="Slide Number Placeholder 3">
             <a:extLst>
               <a:ext uri="{FF2B5EF4-FFF2-40B4-BE49-F238E27FC236}">
-                <a16:creationId xmlns="" xmlns:a16="http://schemas.microsoft.com/office/drawing/2014/main" id="{C31921E1-018C-46BC-A8C8-322A2940309F}"/>
+                <a16:creationId xmlns:a16="http://schemas.microsoft.com/office/drawing/2014/main" id="{C31921E1-018C-46BC-A8C8-322A2940309F}"/>
               </a:ext>
             </a:extLst>
           </p:cNvPr>
@@ -2338,7 +2338,7 @@
           <p:cNvPr id="10" name="Date Placeholder 9">
             <a:extLst>
               <a:ext uri="{FF2B5EF4-FFF2-40B4-BE49-F238E27FC236}">
-                <a16:creationId xmlns="" xmlns:a16="http://schemas.microsoft.com/office/drawing/2014/main" id="{6AD71E90-A095-4E69-9451-395CD82372CC}"/>
+                <a16:creationId xmlns:a16="http://schemas.microsoft.com/office/drawing/2014/main" id="{6AD71E90-A095-4E69-9451-395CD82372CC}"/>
               </a:ext>
             </a:extLst>
           </p:cNvPr>
@@ -2370,7 +2370,7 @@
           <p:cNvPr id="11" name="Footer Placeholder 10">
             <a:extLst>
               <a:ext uri="{FF2B5EF4-FFF2-40B4-BE49-F238E27FC236}">
-                <a16:creationId xmlns="" xmlns:a16="http://schemas.microsoft.com/office/drawing/2014/main" id="{9897A521-89BB-45E2-8829-2778F464A7B2}"/>
+                <a16:creationId xmlns:a16="http://schemas.microsoft.com/office/drawing/2014/main" id="{9897A521-89BB-45E2-8829-2778F464A7B2}"/>
               </a:ext>
             </a:extLst>
           </p:cNvPr>
@@ -2402,7 +2402,7 @@
           <p:cNvPr id="12" name="Slide Number Placeholder 11">
             <a:extLst>
               <a:ext uri="{FF2B5EF4-FFF2-40B4-BE49-F238E27FC236}">
-                <a16:creationId xmlns="" xmlns:a16="http://schemas.microsoft.com/office/drawing/2014/main" id="{E67A9A81-694D-4639-A4B6-89156A3472C8}"/>
+                <a16:creationId xmlns:a16="http://schemas.microsoft.com/office/drawing/2014/main" id="{E67A9A81-694D-4639-A4B6-89156A3472C8}"/>
               </a:ext>
             </a:extLst>
           </p:cNvPr>
@@ -2589,7 +2589,7 @@
           <p:cNvPr id="3" name="Date Placeholder 2">
             <a:extLst>
               <a:ext uri="{FF2B5EF4-FFF2-40B4-BE49-F238E27FC236}">
-                <a16:creationId xmlns="" xmlns:a16="http://schemas.microsoft.com/office/drawing/2014/main" id="{03A7B6BB-4346-41AB-8BAF-8B6DEFB48F7A}"/>
+                <a16:creationId xmlns:a16="http://schemas.microsoft.com/office/drawing/2014/main" id="{03A7B6BB-4346-41AB-8BAF-8B6DEFB48F7A}"/>
               </a:ext>
             </a:extLst>
           </p:cNvPr>
@@ -2621,7 +2621,7 @@
           <p:cNvPr id="4" name="Footer Placeholder 3">
             <a:extLst>
               <a:ext uri="{FF2B5EF4-FFF2-40B4-BE49-F238E27FC236}">
-                <a16:creationId xmlns="" xmlns:a16="http://schemas.microsoft.com/office/drawing/2014/main" id="{C3A322FD-6B4A-490F-ACE4-6D1F18620472}"/>
+                <a16:creationId xmlns:a16="http://schemas.microsoft.com/office/drawing/2014/main" id="{C3A322FD-6B4A-490F-ACE4-6D1F18620472}"/>
               </a:ext>
             </a:extLst>
           </p:cNvPr>
@@ -2653,7 +2653,7 @@
           <p:cNvPr id="6" name="Slide Number Placeholder 5">
             <a:extLst>
               <a:ext uri="{FF2B5EF4-FFF2-40B4-BE49-F238E27FC236}">
-                <a16:creationId xmlns="" xmlns:a16="http://schemas.microsoft.com/office/drawing/2014/main" id="{CBEB5B42-F45F-4D47-A4D6-D98ACFA3A4E4}"/>
+                <a16:creationId xmlns:a16="http://schemas.microsoft.com/office/drawing/2014/main" id="{CBEB5B42-F45F-4D47-A4D6-D98ACFA3A4E4}"/>
               </a:ext>
             </a:extLst>
           </p:cNvPr>
@@ -2795,7 +2795,7 @@
               <a:buNone/>
               <a:tabLst/>
             </a:pPr>
-            <a:endParaRPr kumimoji="0" lang="en-US" sz="2400" b="0" i="0" u="none" strike="noStrike" cap="none" normalizeH="0" baseline="0" smtClean="0">
+            <a:endParaRPr kumimoji="0" lang="en-US" sz="2400" b="0" i="0" u="none" strike="noStrike" cap="none" normalizeH="0" baseline="0">
               <a:ln>
                 <a:noFill/>
               </a:ln>
@@ -2860,7 +2860,7 @@
           <a:p>
             <a:pPr lvl="0"/>
             <a:r>
-              <a:rPr lang="en-US" smtClean="0"/>
+              <a:rPr lang="en-US"/>
               <a:t>Click to edit Master title style</a:t>
             </a:r>
           </a:p>
@@ -2918,35 +2918,35 @@
           <a:p>
             <a:pPr lvl="0"/>
             <a:r>
-              <a:rPr lang="en-US" smtClean="0"/>
+              <a:rPr lang="en-US"/>
               <a:t>Click to edit Master text styles</a:t>
             </a:r>
           </a:p>
           <a:p>
             <a:pPr lvl="1"/>
             <a:r>
-              <a:rPr lang="en-US" smtClean="0"/>
+              <a:rPr lang="en-US"/>
               <a:t>Second level</a:t>
             </a:r>
           </a:p>
           <a:p>
             <a:pPr lvl="2"/>
             <a:r>
-              <a:rPr lang="en-US" smtClean="0"/>
+              <a:rPr lang="en-US"/>
               <a:t>Third level</a:t>
             </a:r>
           </a:p>
           <a:p>
             <a:pPr lvl="3"/>
             <a:r>
-              <a:rPr lang="en-US" smtClean="0"/>
+              <a:rPr lang="en-US"/>
               <a:t>Fourth level</a:t>
             </a:r>
           </a:p>
           <a:p>
             <a:pPr lvl="4"/>
             <a:r>
-              <a:rPr lang="en-US" smtClean="0"/>
+              <a:rPr lang="en-US"/>
               <a:t>Fifth level</a:t>
             </a:r>
           </a:p>
@@ -2999,7 +2999,7 @@
               <a:defRPr/>
             </a:pPr>
             <a:r>
-              <a:rPr lang="en-US" smtClean="0"/>
+              <a:rPr lang="en-US"/>
               <a:t>Murach's HTML and CSS, 4th Edition</a:t>
             </a:r>
             <a:endParaRPr lang="en-US" dirty="0"/>
@@ -3052,7 +3052,7 @@
               <a:defRPr/>
             </a:pPr>
             <a:r>
-              <a:rPr lang="en-US" smtClean="0"/>
+              <a:rPr lang="en-US"/>
               <a:t>© 2018, Mike Murach &amp; Associates, Inc.</a:t>
             </a:r>
             <a:endParaRPr lang="en-US" dirty="0"/>
@@ -3101,7 +3101,7 @@
             <a:pPr algn="l">
               <a:defRPr/>
             </a:pPr>
-            <a:endParaRPr lang="en-US" sz="1400" smtClean="0">
+            <a:endParaRPr lang="en-US" sz="1400">
               <a:latin typeface="Times New Roman"/>
             </a:endParaRPr>
           </a:p>
@@ -3110,7 +3110,7 @@
               <a:defRPr/>
             </a:pPr>
             <a:r>
-              <a:rPr lang="en-US" smtClean="0">
+              <a:rPr lang="en-US">
                 <a:solidFill>
                   <a:schemeClr val="bg1"/>
                 </a:solidFill>
@@ -3574,7 +3574,7 @@
           <p:cNvPr id="2" name="Text Placeholder 1">
             <a:extLst>
               <a:ext uri="{FF2B5EF4-FFF2-40B4-BE49-F238E27FC236}">
-                <a16:creationId xmlns="" xmlns:a16="http://schemas.microsoft.com/office/drawing/2014/main" id="{A683E44D-4E7B-4942-97AB-42AFF39D85D9}"/>
+                <a16:creationId xmlns:a16="http://schemas.microsoft.com/office/drawing/2014/main" id="{A683E44D-4E7B-4942-97AB-42AFF39D85D9}"/>
               </a:ext>
             </a:extLst>
           </p:cNvPr>
@@ -3649,7 +3649,7 @@
           <p:cNvPr id="3" name="Title 2">
             <a:extLst>
               <a:ext uri="{FF2B5EF4-FFF2-40B4-BE49-F238E27FC236}">
-                <a16:creationId xmlns="" xmlns:a16="http://schemas.microsoft.com/office/drawing/2014/main" id="{3D0D66C3-B4F9-4680-BE2F-E7D63605C468}"/>
+                <a16:creationId xmlns:a16="http://schemas.microsoft.com/office/drawing/2014/main" id="{3D0D66C3-B4F9-4680-BE2F-E7D63605C468}"/>
               </a:ext>
             </a:extLst>
           </p:cNvPr>
@@ -3700,7 +3700,7 @@
           <p:cNvPr id="4" name="Date Placeholder 3">
             <a:extLst>
               <a:ext uri="{FF2B5EF4-FFF2-40B4-BE49-F238E27FC236}">
-                <a16:creationId xmlns="" xmlns:a16="http://schemas.microsoft.com/office/drawing/2014/main" id="{63358075-7189-4561-A4E5-98C8C46EDDC9}"/>
+                <a16:creationId xmlns:a16="http://schemas.microsoft.com/office/drawing/2014/main" id="{63358075-7189-4561-A4E5-98C8C46EDDC9}"/>
               </a:ext>
             </a:extLst>
           </p:cNvPr>
@@ -3732,7 +3732,7 @@
           <p:cNvPr id="5" name="Footer Placeholder 4">
             <a:extLst>
               <a:ext uri="{FF2B5EF4-FFF2-40B4-BE49-F238E27FC236}">
-                <a16:creationId xmlns="" xmlns:a16="http://schemas.microsoft.com/office/drawing/2014/main" id="{122A3984-E668-431C-B47A-D79A7058C76A}"/>
+                <a16:creationId xmlns:a16="http://schemas.microsoft.com/office/drawing/2014/main" id="{122A3984-E668-431C-B47A-D79A7058C76A}"/>
               </a:ext>
             </a:extLst>
           </p:cNvPr>
@@ -3764,7 +3764,7 @@
           <p:cNvPr id="6" name="Slide Number Placeholder 5">
             <a:extLst>
               <a:ext uri="{FF2B5EF4-FFF2-40B4-BE49-F238E27FC236}">
-                <a16:creationId xmlns="" xmlns:a16="http://schemas.microsoft.com/office/drawing/2014/main" id="{4AFF6169-E941-478B-83FF-531399080CB6}"/>
+                <a16:creationId xmlns:a16="http://schemas.microsoft.com/office/drawing/2014/main" id="{4AFF6169-E941-478B-83FF-531399080CB6}"/>
               </a:ext>
             </a:extLst>
           </p:cNvPr>
@@ -3853,7 +3853,7 @@
           <p:cNvPr id="2" name="Title 1">
             <a:extLst>
               <a:ext uri="{FF2B5EF4-FFF2-40B4-BE49-F238E27FC236}">
-                <a16:creationId xmlns="" xmlns:a16="http://schemas.microsoft.com/office/drawing/2014/main" id="{B9DB67DB-5F95-4202-9364-E6FB7ED3D51A}"/>
+                <a16:creationId xmlns:a16="http://schemas.microsoft.com/office/drawing/2014/main" id="{B9DB67DB-5F95-4202-9364-E6FB7ED3D51A}"/>
               </a:ext>
             </a:extLst>
           </p:cNvPr>
@@ -3897,7 +3897,7 @@
           <p:cNvPr id="3" name="Text Placeholder 2">
             <a:extLst>
               <a:ext uri="{FF2B5EF4-FFF2-40B4-BE49-F238E27FC236}">
-                <a16:creationId xmlns="" xmlns:a16="http://schemas.microsoft.com/office/drawing/2014/main" id="{A37853C3-FC59-441C-AA71-B8890E06E25E}"/>
+                <a16:creationId xmlns:a16="http://schemas.microsoft.com/office/drawing/2014/main" id="{A37853C3-FC59-441C-AA71-B8890E06E25E}"/>
               </a:ext>
             </a:extLst>
           </p:cNvPr>
@@ -3978,7 +3978,7 @@
           <p:cNvPr id="4" name="Date Placeholder 3">
             <a:extLst>
               <a:ext uri="{FF2B5EF4-FFF2-40B4-BE49-F238E27FC236}">
-                <a16:creationId xmlns="" xmlns:a16="http://schemas.microsoft.com/office/drawing/2014/main" id="{26480EF0-AD3D-418D-BF42-E544DE877F78}"/>
+                <a16:creationId xmlns:a16="http://schemas.microsoft.com/office/drawing/2014/main" id="{26480EF0-AD3D-418D-BF42-E544DE877F78}"/>
               </a:ext>
             </a:extLst>
           </p:cNvPr>
@@ -4010,7 +4010,7 @@
           <p:cNvPr id="5" name="Footer Placeholder 4">
             <a:extLst>
               <a:ext uri="{FF2B5EF4-FFF2-40B4-BE49-F238E27FC236}">
-                <a16:creationId xmlns="" xmlns:a16="http://schemas.microsoft.com/office/drawing/2014/main" id="{96A28A8C-FD6A-4435-BDC0-94760DCD3C4C}"/>
+                <a16:creationId xmlns:a16="http://schemas.microsoft.com/office/drawing/2014/main" id="{96A28A8C-FD6A-4435-BDC0-94760DCD3C4C}"/>
               </a:ext>
             </a:extLst>
           </p:cNvPr>
@@ -4042,7 +4042,7 @@
           <p:cNvPr id="6" name="Slide Number Placeholder 5">
             <a:extLst>
               <a:ext uri="{FF2B5EF4-FFF2-40B4-BE49-F238E27FC236}">
-                <a16:creationId xmlns="" xmlns:a16="http://schemas.microsoft.com/office/drawing/2014/main" id="{5105FBC0-14C4-4C58-AC04-D4C87BD9BC72}"/>
+                <a16:creationId xmlns:a16="http://schemas.microsoft.com/office/drawing/2014/main" id="{5105FBC0-14C4-4C58-AC04-D4C87BD9BC72}"/>
               </a:ext>
             </a:extLst>
           </p:cNvPr>
@@ -4131,7 +4131,7 @@
           <p:cNvPr id="2" name="Title 1">
             <a:extLst>
               <a:ext uri="{FF2B5EF4-FFF2-40B4-BE49-F238E27FC236}">
-                <a16:creationId xmlns="" xmlns:a16="http://schemas.microsoft.com/office/drawing/2014/main" id="{08D21225-05A8-4410-9B02-885E18EE6C39}"/>
+                <a16:creationId xmlns:a16="http://schemas.microsoft.com/office/drawing/2014/main" id="{08D21225-05A8-4410-9B02-885E18EE6C39}"/>
               </a:ext>
             </a:extLst>
           </p:cNvPr>
@@ -4175,7 +4175,7 @@
           <p:cNvPr id="3" name="Text Placeholder 2">
             <a:extLst>
               <a:ext uri="{FF2B5EF4-FFF2-40B4-BE49-F238E27FC236}">
-                <a16:creationId xmlns="" xmlns:a16="http://schemas.microsoft.com/office/drawing/2014/main" id="{C19DB45E-0CFA-4983-BA36-D83E25AC693C}"/>
+                <a16:creationId xmlns:a16="http://schemas.microsoft.com/office/drawing/2014/main" id="{C19DB45E-0CFA-4983-BA36-D83E25AC693C}"/>
               </a:ext>
             </a:extLst>
           </p:cNvPr>
@@ -4308,15 +4308,7 @@
                 <a:ea typeface="Times New Roman" panose="02020603050405020304" pitchFamily="18" charset="0"/>
                 <a:cs typeface="Times New Roman" panose="02020603050405020304" pitchFamily="18" charset="0"/>
               </a:rPr>
-              <a:t>="</a:t>
-            </a:r>
-            <a:r>
-              <a:rPr lang="en-US" sz="1600" b="1" dirty="0" smtClean="0">
-                <a:latin typeface="Courier New" panose="02070309020205020404" pitchFamily="49" charset="0"/>
-                <a:ea typeface="Times New Roman" panose="02020603050405020304" pitchFamily="18" charset="0"/>
-                <a:cs typeface="Times New Roman" panose="02020603050405020304" pitchFamily="18" charset="0"/>
-              </a:rPr>
-              <a:t>contact.html"</a:t>
+              <a:t>="contact.html"</a:t>
             </a:r>
           </a:p>
           <a:p>
@@ -4337,47 +4329,7 @@
                 <a:ea typeface="Times New Roman" panose="02020603050405020304" pitchFamily="18" charset="0"/>
                 <a:cs typeface="Times New Roman" panose="02020603050405020304" pitchFamily="18" charset="0"/>
               </a:rPr>
-              <a:t> </a:t>
-            </a:r>
-            <a:r>
-              <a:rPr lang="en-US" sz="1600" b="1" dirty="0" smtClean="0">
-                <a:latin typeface="Courier New" panose="02070309020205020404" pitchFamily="49" charset="0"/>
-                <a:ea typeface="Times New Roman" panose="02020603050405020304" pitchFamily="18" charset="0"/>
-                <a:cs typeface="Times New Roman" panose="02020603050405020304" pitchFamily="18" charset="0"/>
-              </a:rPr>
-              <a:t> </a:t>
-            </a:r>
-            <a:r>
-              <a:rPr lang="en-US" sz="1600" b="1" dirty="0" smtClean="0">
-                <a:latin typeface="Courier New" panose="02070309020205020404" pitchFamily="49" charset="0"/>
-                <a:ea typeface="Times New Roman" panose="02020603050405020304" pitchFamily="18" charset="0"/>
-                <a:cs typeface="Times New Roman" panose="02020603050405020304" pitchFamily="18" charset="0"/>
-              </a:rPr>
-              <a:t> </a:t>
-            </a:r>
-            <a:r>
-              <a:rPr lang="en-US" sz="1600" b="1" dirty="0">
-                <a:latin typeface="Courier New" panose="02070309020205020404" pitchFamily="49" charset="0"/>
-                <a:ea typeface="Times New Roman" panose="02020603050405020304" pitchFamily="18" charset="0"/>
-                <a:cs typeface="Times New Roman" panose="02020603050405020304" pitchFamily="18" charset="0"/>
-              </a:rPr>
-              <a:t>title</a:t>
-            </a:r>
-            <a:r>
-              <a:rPr lang="en-US" sz="1600" b="1" dirty="0" smtClean="0">
-                <a:latin typeface="Courier New" panose="02070309020205020404" pitchFamily="49" charset="0"/>
-                <a:ea typeface="Times New Roman" panose="02020603050405020304" pitchFamily="18" charset="0"/>
-                <a:cs typeface="Times New Roman" panose="02020603050405020304" pitchFamily="18" charset="0"/>
-              </a:rPr>
-              <a:t>="</a:t>
-            </a:r>
-            <a:r>
-              <a:rPr lang="en-US" sz="1600" b="1" dirty="0">
-                <a:latin typeface="Courier New" panose="02070309020205020404" pitchFamily="49" charset="0"/>
-                <a:ea typeface="Times New Roman" panose="02020603050405020304" pitchFamily="18" charset="0"/>
-                <a:cs typeface="Times New Roman" panose="02020603050405020304" pitchFamily="18" charset="0"/>
-              </a:rPr>
-              <a:t>Click to Contact Us" </a:t>
+              <a:t>   title="Click to Contact Us" </a:t>
             </a:r>
             <a:r>
               <a:rPr lang="en-US" sz="1600" b="1" dirty="0">
@@ -4431,7 +4383,7 @@
           <p:cNvPr id="4" name="Date Placeholder 3">
             <a:extLst>
               <a:ext uri="{FF2B5EF4-FFF2-40B4-BE49-F238E27FC236}">
-                <a16:creationId xmlns="" xmlns:a16="http://schemas.microsoft.com/office/drawing/2014/main" id="{D1D8F7BB-B979-423E-92D5-A6726D4B9C95}"/>
+                <a16:creationId xmlns:a16="http://schemas.microsoft.com/office/drawing/2014/main" id="{D1D8F7BB-B979-423E-92D5-A6726D4B9C95}"/>
               </a:ext>
             </a:extLst>
           </p:cNvPr>
@@ -4463,7 +4415,7 @@
           <p:cNvPr id="5" name="Footer Placeholder 4">
             <a:extLst>
               <a:ext uri="{FF2B5EF4-FFF2-40B4-BE49-F238E27FC236}">
-                <a16:creationId xmlns="" xmlns:a16="http://schemas.microsoft.com/office/drawing/2014/main" id="{40E8C1DA-D726-46D6-80A6-7395A3DC71BF}"/>
+                <a16:creationId xmlns:a16="http://schemas.microsoft.com/office/drawing/2014/main" id="{40E8C1DA-D726-46D6-80A6-7395A3DC71BF}"/>
               </a:ext>
             </a:extLst>
           </p:cNvPr>
@@ -4495,7 +4447,7 @@
           <p:cNvPr id="6" name="Slide Number Placeholder 5">
             <a:extLst>
               <a:ext uri="{FF2B5EF4-FFF2-40B4-BE49-F238E27FC236}">
-                <a16:creationId xmlns="" xmlns:a16="http://schemas.microsoft.com/office/drawing/2014/main" id="{1B82136B-DEFC-4AD7-B38D-97CF9D6B6735}"/>
+                <a16:creationId xmlns:a16="http://schemas.microsoft.com/office/drawing/2014/main" id="{1B82136B-DEFC-4AD7-B38D-97CF9D6B6735}"/>
               </a:ext>
             </a:extLst>
           </p:cNvPr>
@@ -4584,7 +4536,7 @@
           <p:cNvPr id="2" name="Title 1">
             <a:extLst>
               <a:ext uri="{FF2B5EF4-FFF2-40B4-BE49-F238E27FC236}">
-                <a16:creationId xmlns="" xmlns:a16="http://schemas.microsoft.com/office/drawing/2014/main" id="{F4004A83-B6D2-423F-833E-D008B9716759}"/>
+                <a16:creationId xmlns:a16="http://schemas.microsoft.com/office/drawing/2014/main" id="{F4004A83-B6D2-423F-833E-D008B9716759}"/>
               </a:ext>
             </a:extLst>
           </p:cNvPr>
@@ -4628,7 +4580,7 @@
           <p:cNvPr id="3" name="Text Placeholder 2">
             <a:extLst>
               <a:ext uri="{FF2B5EF4-FFF2-40B4-BE49-F238E27FC236}">
-                <a16:creationId xmlns="" xmlns:a16="http://schemas.microsoft.com/office/drawing/2014/main" id="{81C77930-500A-4E16-BA99-A9B43D0CD416}"/>
+                <a16:creationId xmlns:a16="http://schemas.microsoft.com/office/drawing/2014/main" id="{81C77930-500A-4E16-BA99-A9B43D0CD416}"/>
               </a:ext>
             </a:extLst>
           </p:cNvPr>
@@ -5248,7 +5200,7 @@
           <p:cNvPr id="4" name="Date Placeholder 3">
             <a:extLst>
               <a:ext uri="{FF2B5EF4-FFF2-40B4-BE49-F238E27FC236}">
-                <a16:creationId xmlns="" xmlns:a16="http://schemas.microsoft.com/office/drawing/2014/main" id="{9F9D03B5-42B0-467E-867B-DF43177A9E57}"/>
+                <a16:creationId xmlns:a16="http://schemas.microsoft.com/office/drawing/2014/main" id="{9F9D03B5-42B0-467E-867B-DF43177A9E57}"/>
               </a:ext>
             </a:extLst>
           </p:cNvPr>
@@ -5280,7 +5232,7 @@
           <p:cNvPr id="5" name="Footer Placeholder 4">
             <a:extLst>
               <a:ext uri="{FF2B5EF4-FFF2-40B4-BE49-F238E27FC236}">
-                <a16:creationId xmlns="" xmlns:a16="http://schemas.microsoft.com/office/drawing/2014/main" id="{A8FB6463-6E86-4529-957A-AC0F8F160A5B}"/>
+                <a16:creationId xmlns:a16="http://schemas.microsoft.com/office/drawing/2014/main" id="{A8FB6463-6E86-4529-957A-AC0F8F160A5B}"/>
               </a:ext>
             </a:extLst>
           </p:cNvPr>
@@ -5312,7 +5264,7 @@
           <p:cNvPr id="6" name="Slide Number Placeholder 5">
             <a:extLst>
               <a:ext uri="{FF2B5EF4-FFF2-40B4-BE49-F238E27FC236}">
-                <a16:creationId xmlns="" xmlns:a16="http://schemas.microsoft.com/office/drawing/2014/main" id="{F2863729-3B13-4D11-A885-EB9E30EFE26A}"/>
+                <a16:creationId xmlns:a16="http://schemas.microsoft.com/office/drawing/2014/main" id="{F2863729-3B13-4D11-A885-EB9E30EFE26A}"/>
               </a:ext>
             </a:extLst>
           </p:cNvPr>
@@ -5401,7 +5353,7 @@
           <p:cNvPr id="2" name="Title 1">
             <a:extLst>
               <a:ext uri="{FF2B5EF4-FFF2-40B4-BE49-F238E27FC236}">
-                <a16:creationId xmlns="" xmlns:a16="http://schemas.microsoft.com/office/drawing/2014/main" id="{40FA0791-5314-4C98-8705-74EFD7665F6F}"/>
+                <a16:creationId xmlns:a16="http://schemas.microsoft.com/office/drawing/2014/main" id="{40FA0791-5314-4C98-8705-74EFD7665F6F}"/>
               </a:ext>
             </a:extLst>
           </p:cNvPr>
@@ -5445,7 +5397,7 @@
           <p:cNvPr id="7" name="Content Placeholder 6" descr="See page 54 in book" title="See slide title">
             <a:extLst>
               <a:ext uri="{FF2B5EF4-FFF2-40B4-BE49-F238E27FC236}">
-                <a16:creationId xmlns="" xmlns:a16="http://schemas.microsoft.com/office/drawing/2014/main" id="{66CF1B1C-8305-4091-80B0-456D8B936095}"/>
+                <a16:creationId xmlns:a16="http://schemas.microsoft.com/office/drawing/2014/main" id="{66CF1B1C-8305-4091-80B0-456D8B936095}"/>
               </a:ext>
             </a:extLst>
           </p:cNvPr>
@@ -5483,7 +5435,7 @@
           <p:cNvPr id="4" name="Date Placeholder 3">
             <a:extLst>
               <a:ext uri="{FF2B5EF4-FFF2-40B4-BE49-F238E27FC236}">
-                <a16:creationId xmlns="" xmlns:a16="http://schemas.microsoft.com/office/drawing/2014/main" id="{BC0E41B0-8693-4E68-974C-8FD5ACAA5A36}"/>
+                <a16:creationId xmlns:a16="http://schemas.microsoft.com/office/drawing/2014/main" id="{BC0E41B0-8693-4E68-974C-8FD5ACAA5A36}"/>
               </a:ext>
             </a:extLst>
           </p:cNvPr>
@@ -5515,7 +5467,7 @@
           <p:cNvPr id="5" name="Footer Placeholder 4">
             <a:extLst>
               <a:ext uri="{FF2B5EF4-FFF2-40B4-BE49-F238E27FC236}">
-                <a16:creationId xmlns="" xmlns:a16="http://schemas.microsoft.com/office/drawing/2014/main" id="{A5002CA6-F21F-492F-BD67-DDD763CE5F8B}"/>
+                <a16:creationId xmlns:a16="http://schemas.microsoft.com/office/drawing/2014/main" id="{A5002CA6-F21F-492F-BD67-DDD763CE5F8B}"/>
               </a:ext>
             </a:extLst>
           </p:cNvPr>
@@ -5547,7 +5499,7 @@
           <p:cNvPr id="6" name="Slide Number Placeholder 5">
             <a:extLst>
               <a:ext uri="{FF2B5EF4-FFF2-40B4-BE49-F238E27FC236}">
-                <a16:creationId xmlns="" xmlns:a16="http://schemas.microsoft.com/office/drawing/2014/main" id="{8298DA32-75B1-4AEC-8A40-6CE83ACBBACC}"/>
+                <a16:creationId xmlns:a16="http://schemas.microsoft.com/office/drawing/2014/main" id="{8298DA32-75B1-4AEC-8A40-6CE83ACBBACC}"/>
               </a:ext>
             </a:extLst>
           </p:cNvPr>
@@ -5636,7 +5588,7 @@
           <p:cNvPr id="2" name="Title 1">
             <a:extLst>
               <a:ext uri="{FF2B5EF4-FFF2-40B4-BE49-F238E27FC236}">
-                <a16:creationId xmlns="" xmlns:a16="http://schemas.microsoft.com/office/drawing/2014/main" id="{88090369-1929-4EEC-BE2C-2EE448E0A9FF}"/>
+                <a16:creationId xmlns:a16="http://schemas.microsoft.com/office/drawing/2014/main" id="{88090369-1929-4EEC-BE2C-2EE448E0A9FF}"/>
               </a:ext>
             </a:extLst>
           </p:cNvPr>
@@ -5680,7 +5632,7 @@
           <p:cNvPr id="3" name="Text Placeholder 2">
             <a:extLst>
               <a:ext uri="{FF2B5EF4-FFF2-40B4-BE49-F238E27FC236}">
-                <a16:creationId xmlns="" xmlns:a16="http://schemas.microsoft.com/office/drawing/2014/main" id="{9D2641C6-FC60-45BC-9C15-45B77CDF6B02}"/>
+                <a16:creationId xmlns:a16="http://schemas.microsoft.com/office/drawing/2014/main" id="{9D2641C6-FC60-45BC-9C15-45B77CDF6B02}"/>
               </a:ext>
             </a:extLst>
           </p:cNvPr>
@@ -6192,7 +6144,7 @@
           <p:cNvPr id="4" name="Date Placeholder 3">
             <a:extLst>
               <a:ext uri="{FF2B5EF4-FFF2-40B4-BE49-F238E27FC236}">
-                <a16:creationId xmlns="" xmlns:a16="http://schemas.microsoft.com/office/drawing/2014/main" id="{851BE9B5-7567-469D-AEAE-879D62A99783}"/>
+                <a16:creationId xmlns:a16="http://schemas.microsoft.com/office/drawing/2014/main" id="{851BE9B5-7567-469D-AEAE-879D62A99783}"/>
               </a:ext>
             </a:extLst>
           </p:cNvPr>
@@ -6224,7 +6176,7 @@
           <p:cNvPr id="5" name="Footer Placeholder 4">
             <a:extLst>
               <a:ext uri="{FF2B5EF4-FFF2-40B4-BE49-F238E27FC236}">
-                <a16:creationId xmlns="" xmlns:a16="http://schemas.microsoft.com/office/drawing/2014/main" id="{31D481CD-8A77-471D-90ED-9F7608E05843}"/>
+                <a16:creationId xmlns:a16="http://schemas.microsoft.com/office/drawing/2014/main" id="{31D481CD-8A77-471D-90ED-9F7608E05843}"/>
               </a:ext>
             </a:extLst>
           </p:cNvPr>
@@ -6256,7 +6208,7 @@
           <p:cNvPr id="6" name="Slide Number Placeholder 5">
             <a:extLst>
               <a:ext uri="{FF2B5EF4-FFF2-40B4-BE49-F238E27FC236}">
-                <a16:creationId xmlns="" xmlns:a16="http://schemas.microsoft.com/office/drawing/2014/main" id="{D86F81AD-35AF-4B8F-8D00-F912CEA07BD0}"/>
+                <a16:creationId xmlns:a16="http://schemas.microsoft.com/office/drawing/2014/main" id="{D86F81AD-35AF-4B8F-8D00-F912CEA07BD0}"/>
               </a:ext>
             </a:extLst>
           </p:cNvPr>
@@ -6345,7 +6297,7 @@
           <p:cNvPr id="2" name="Title 1">
             <a:extLst>
               <a:ext uri="{FF2B5EF4-FFF2-40B4-BE49-F238E27FC236}">
-                <a16:creationId xmlns="" xmlns:a16="http://schemas.microsoft.com/office/drawing/2014/main" id="{E315C1EC-BE65-4421-98EE-5D5CFB4EEF0B}"/>
+                <a16:creationId xmlns:a16="http://schemas.microsoft.com/office/drawing/2014/main" id="{E315C1EC-BE65-4421-98EE-5D5CFB4EEF0B}"/>
               </a:ext>
             </a:extLst>
           </p:cNvPr>
@@ -6389,7 +6341,7 @@
           <p:cNvPr id="3" name="Text Placeholder 2">
             <a:extLst>
               <a:ext uri="{FF2B5EF4-FFF2-40B4-BE49-F238E27FC236}">
-                <a16:creationId xmlns="" xmlns:a16="http://schemas.microsoft.com/office/drawing/2014/main" id="{A326AB7C-104E-44B8-83ED-8758C8CD6374}"/>
+                <a16:creationId xmlns:a16="http://schemas.microsoft.com/office/drawing/2014/main" id="{A326AB7C-104E-44B8-83ED-8758C8CD6374}"/>
               </a:ext>
             </a:extLst>
           </p:cNvPr>
@@ -6792,7 +6744,7 @@
           <p:cNvPr id="4" name="Date Placeholder 3">
             <a:extLst>
               <a:ext uri="{FF2B5EF4-FFF2-40B4-BE49-F238E27FC236}">
-                <a16:creationId xmlns="" xmlns:a16="http://schemas.microsoft.com/office/drawing/2014/main" id="{C0AAC334-3760-4B3E-95B9-5BEF3F3CB04B}"/>
+                <a16:creationId xmlns:a16="http://schemas.microsoft.com/office/drawing/2014/main" id="{C0AAC334-3760-4B3E-95B9-5BEF3F3CB04B}"/>
               </a:ext>
             </a:extLst>
           </p:cNvPr>
@@ -6824,7 +6776,7 @@
           <p:cNvPr id="5" name="Footer Placeholder 4">
             <a:extLst>
               <a:ext uri="{FF2B5EF4-FFF2-40B4-BE49-F238E27FC236}">
-                <a16:creationId xmlns="" xmlns:a16="http://schemas.microsoft.com/office/drawing/2014/main" id="{A658318D-EA47-4D37-97FE-37B4AA9E13B6}"/>
+                <a16:creationId xmlns:a16="http://schemas.microsoft.com/office/drawing/2014/main" id="{A658318D-EA47-4D37-97FE-37B4AA9E13B6}"/>
               </a:ext>
             </a:extLst>
           </p:cNvPr>
@@ -6856,7 +6808,7 @@
           <p:cNvPr id="6" name="Slide Number Placeholder 5">
             <a:extLst>
               <a:ext uri="{FF2B5EF4-FFF2-40B4-BE49-F238E27FC236}">
-                <a16:creationId xmlns="" xmlns:a16="http://schemas.microsoft.com/office/drawing/2014/main" id="{C9A92148-D55A-4A26-B100-12E075E5D477}"/>
+                <a16:creationId xmlns:a16="http://schemas.microsoft.com/office/drawing/2014/main" id="{C9A92148-D55A-4A26-B100-12E075E5D477}"/>
               </a:ext>
             </a:extLst>
           </p:cNvPr>
@@ -6945,7 +6897,7 @@
           <p:cNvPr id="2" name="Title 1">
             <a:extLst>
               <a:ext uri="{FF2B5EF4-FFF2-40B4-BE49-F238E27FC236}">
-                <a16:creationId xmlns="" xmlns:a16="http://schemas.microsoft.com/office/drawing/2014/main" id="{8227FE9B-E517-46E9-A587-9B8080EA6DE6}"/>
+                <a16:creationId xmlns:a16="http://schemas.microsoft.com/office/drawing/2014/main" id="{8227FE9B-E517-46E9-A587-9B8080EA6DE6}"/>
               </a:ext>
             </a:extLst>
           </p:cNvPr>
@@ -6989,7 +6941,7 @@
           <p:cNvPr id="3" name="Text Placeholder 2">
             <a:extLst>
               <a:ext uri="{FF2B5EF4-FFF2-40B4-BE49-F238E27FC236}">
-                <a16:creationId xmlns="" xmlns:a16="http://schemas.microsoft.com/office/drawing/2014/main" id="{4445973B-0659-47E2-A692-3E35345D8FF4}"/>
+                <a16:creationId xmlns:a16="http://schemas.microsoft.com/office/drawing/2014/main" id="{4445973B-0659-47E2-A692-3E35345D8FF4}"/>
               </a:ext>
             </a:extLst>
           </p:cNvPr>
@@ -7018,7 +6970,7 @@
               </a:tabLst>
             </a:pPr>
             <a:r>
-              <a:rPr lang="en-US" sz="1600" b="1" spc="-10" dirty="0">
+              <a:rPr lang="en-US" sz="1600" b="1" u="sng" spc="-10" dirty="0">
                 <a:latin typeface="Arial" panose="020B0604020202020204" pitchFamily="34" charset="0"/>
                 <a:ea typeface="Times New Roman" panose="02020603050405020304" pitchFamily="18" charset="0"/>
                 <a:cs typeface="Times New Roman" panose="02020603050405020304" pitchFamily="18" charset="0"/>
@@ -7208,7 +7160,7 @@
               </a:tabLst>
             </a:pPr>
             <a:r>
-              <a:rPr lang="en-US" sz="1600" b="1" spc="-10" dirty="0">
+              <a:rPr lang="en-US" sz="1600" b="1" u="sng" spc="-10" dirty="0">
                 <a:latin typeface="Arial" panose="020B0604020202020204" pitchFamily="34" charset="0"/>
                 <a:ea typeface="Times New Roman" panose="02020603050405020304" pitchFamily="18" charset="0"/>
                 <a:cs typeface="Times New Roman" panose="02020603050405020304" pitchFamily="18" charset="0"/>
@@ -7314,7 +7266,7 @@
               </a:tabLst>
             </a:pPr>
             <a:r>
-              <a:rPr lang="en-US" sz="1600" b="1" spc="-10" dirty="0">
+              <a:rPr lang="en-US" sz="1600" b="1" u="sng" spc="-10" dirty="0">
                 <a:latin typeface="Arial" panose="020B0604020202020204" pitchFamily="34" charset="0"/>
                 <a:ea typeface="Times New Roman" panose="02020603050405020304" pitchFamily="18" charset="0"/>
                 <a:cs typeface="Times New Roman" panose="02020603050405020304" pitchFamily="18" charset="0"/>
@@ -7411,7 +7363,7 @@
           <p:cNvPr id="4" name="Date Placeholder 3">
             <a:extLst>
               <a:ext uri="{FF2B5EF4-FFF2-40B4-BE49-F238E27FC236}">
-                <a16:creationId xmlns="" xmlns:a16="http://schemas.microsoft.com/office/drawing/2014/main" id="{E563147B-AED1-4CF1-98C5-9CC8ED79636F}"/>
+                <a16:creationId xmlns:a16="http://schemas.microsoft.com/office/drawing/2014/main" id="{E563147B-AED1-4CF1-98C5-9CC8ED79636F}"/>
               </a:ext>
             </a:extLst>
           </p:cNvPr>
@@ -7443,7 +7395,7 @@
           <p:cNvPr id="5" name="Footer Placeholder 4">
             <a:extLst>
               <a:ext uri="{FF2B5EF4-FFF2-40B4-BE49-F238E27FC236}">
-                <a16:creationId xmlns="" xmlns:a16="http://schemas.microsoft.com/office/drawing/2014/main" id="{59C74891-F2D2-44AD-9D87-5C020E63DF3A}"/>
+                <a16:creationId xmlns:a16="http://schemas.microsoft.com/office/drawing/2014/main" id="{59C74891-F2D2-44AD-9D87-5C020E63DF3A}"/>
               </a:ext>
             </a:extLst>
           </p:cNvPr>
@@ -7475,7 +7427,7 @@
           <p:cNvPr id="6" name="Slide Number Placeholder 5">
             <a:extLst>
               <a:ext uri="{FF2B5EF4-FFF2-40B4-BE49-F238E27FC236}">
-                <a16:creationId xmlns="" xmlns:a16="http://schemas.microsoft.com/office/drawing/2014/main" id="{B987FA53-B634-4692-8D0E-1EB0324BAFE3}"/>
+                <a16:creationId xmlns:a16="http://schemas.microsoft.com/office/drawing/2014/main" id="{B987FA53-B634-4692-8D0E-1EB0324BAFE3}"/>
               </a:ext>
             </a:extLst>
           </p:cNvPr>
@@ -7564,7 +7516,7 @@
           <p:cNvPr id="2" name="Title 1">
             <a:extLst>
               <a:ext uri="{FF2B5EF4-FFF2-40B4-BE49-F238E27FC236}">
-                <a16:creationId xmlns="" xmlns:a16="http://schemas.microsoft.com/office/drawing/2014/main" id="{41524801-8F27-4677-8F2E-AA7FD1871BEE}"/>
+                <a16:creationId xmlns:a16="http://schemas.microsoft.com/office/drawing/2014/main" id="{41524801-8F27-4677-8F2E-AA7FD1871BEE}"/>
               </a:ext>
             </a:extLst>
           </p:cNvPr>
@@ -7608,7 +7560,7 @@
           <p:cNvPr id="7" name="Content Placeholder 6" descr="See page 56 in book" title="See slide title">
             <a:extLst>
               <a:ext uri="{FF2B5EF4-FFF2-40B4-BE49-F238E27FC236}">
-                <a16:creationId xmlns="" xmlns:a16="http://schemas.microsoft.com/office/drawing/2014/main" id="{BAE0C2C6-3320-4CC4-92FC-386D9FEBABE9}"/>
+                <a16:creationId xmlns:a16="http://schemas.microsoft.com/office/drawing/2014/main" id="{BAE0C2C6-3320-4CC4-92FC-386D9FEBABE9}"/>
               </a:ext>
             </a:extLst>
           </p:cNvPr>
@@ -7646,7 +7598,7 @@
           <p:cNvPr id="4" name="Date Placeholder 3">
             <a:extLst>
               <a:ext uri="{FF2B5EF4-FFF2-40B4-BE49-F238E27FC236}">
-                <a16:creationId xmlns="" xmlns:a16="http://schemas.microsoft.com/office/drawing/2014/main" id="{D8A83FBF-A451-4DC5-AFDC-F05C8D999E42}"/>
+                <a16:creationId xmlns:a16="http://schemas.microsoft.com/office/drawing/2014/main" id="{D8A83FBF-A451-4DC5-AFDC-F05C8D999E42}"/>
               </a:ext>
             </a:extLst>
           </p:cNvPr>
@@ -7678,7 +7630,7 @@
           <p:cNvPr id="5" name="Footer Placeholder 4">
             <a:extLst>
               <a:ext uri="{FF2B5EF4-FFF2-40B4-BE49-F238E27FC236}">
-                <a16:creationId xmlns="" xmlns:a16="http://schemas.microsoft.com/office/drawing/2014/main" id="{E3F27958-FAD7-44A9-8C5B-43D05E23058E}"/>
+                <a16:creationId xmlns:a16="http://schemas.microsoft.com/office/drawing/2014/main" id="{E3F27958-FAD7-44A9-8C5B-43D05E23058E}"/>
               </a:ext>
             </a:extLst>
           </p:cNvPr>
@@ -7710,7 +7662,7 @@
           <p:cNvPr id="6" name="Slide Number Placeholder 5">
             <a:extLst>
               <a:ext uri="{FF2B5EF4-FFF2-40B4-BE49-F238E27FC236}">
-                <a16:creationId xmlns="" xmlns:a16="http://schemas.microsoft.com/office/drawing/2014/main" id="{0A4BA80F-FD17-4416-8A37-D507456E50B2}"/>
+                <a16:creationId xmlns:a16="http://schemas.microsoft.com/office/drawing/2014/main" id="{0A4BA80F-FD17-4416-8A37-D507456E50B2}"/>
               </a:ext>
             </a:extLst>
           </p:cNvPr>
@@ -7799,7 +7751,7 @@
           <p:cNvPr id="2" name="Title 1">
             <a:extLst>
               <a:ext uri="{FF2B5EF4-FFF2-40B4-BE49-F238E27FC236}">
-                <a16:creationId xmlns="" xmlns:a16="http://schemas.microsoft.com/office/drawing/2014/main" id="{24C009CA-4DFE-4316-9ECB-2718A0A3F206}"/>
+                <a16:creationId xmlns:a16="http://schemas.microsoft.com/office/drawing/2014/main" id="{24C009CA-4DFE-4316-9ECB-2718A0A3F206}"/>
               </a:ext>
             </a:extLst>
           </p:cNvPr>
@@ -7843,7 +7795,7 @@
           <p:cNvPr id="7" name="Content Placeholder 6" descr="See page 58 in book" title="See slide title">
             <a:extLst>
               <a:ext uri="{FF2B5EF4-FFF2-40B4-BE49-F238E27FC236}">
-                <a16:creationId xmlns="" xmlns:a16="http://schemas.microsoft.com/office/drawing/2014/main" id="{B6BF6AB5-269B-438E-9356-11AA92518BBF}"/>
+                <a16:creationId xmlns:a16="http://schemas.microsoft.com/office/drawing/2014/main" id="{B6BF6AB5-269B-438E-9356-11AA92518BBF}"/>
               </a:ext>
             </a:extLst>
           </p:cNvPr>
@@ -7888,7 +7840,7 @@
           <p:cNvPr id="4" name="Date Placeholder 3">
             <a:extLst>
               <a:ext uri="{FF2B5EF4-FFF2-40B4-BE49-F238E27FC236}">
-                <a16:creationId xmlns="" xmlns:a16="http://schemas.microsoft.com/office/drawing/2014/main" id="{76F568AA-DE14-479C-BE59-50A68FF2BA65}"/>
+                <a16:creationId xmlns:a16="http://schemas.microsoft.com/office/drawing/2014/main" id="{76F568AA-DE14-479C-BE59-50A68FF2BA65}"/>
               </a:ext>
             </a:extLst>
           </p:cNvPr>
@@ -7920,7 +7872,7 @@
           <p:cNvPr id="5" name="Footer Placeholder 4">
             <a:extLst>
               <a:ext uri="{FF2B5EF4-FFF2-40B4-BE49-F238E27FC236}">
-                <a16:creationId xmlns="" xmlns:a16="http://schemas.microsoft.com/office/drawing/2014/main" id="{996DBA3A-862C-4EBC-9888-0DF97AC0EB21}"/>
+                <a16:creationId xmlns:a16="http://schemas.microsoft.com/office/drawing/2014/main" id="{996DBA3A-862C-4EBC-9888-0DF97AC0EB21}"/>
               </a:ext>
             </a:extLst>
           </p:cNvPr>
@@ -7952,7 +7904,7 @@
           <p:cNvPr id="6" name="Slide Number Placeholder 5">
             <a:extLst>
               <a:ext uri="{FF2B5EF4-FFF2-40B4-BE49-F238E27FC236}">
-                <a16:creationId xmlns="" xmlns:a16="http://schemas.microsoft.com/office/drawing/2014/main" id="{3BB4F97D-9965-4F94-9940-9EF30D2C5335}"/>
+                <a16:creationId xmlns:a16="http://schemas.microsoft.com/office/drawing/2014/main" id="{3BB4F97D-9965-4F94-9940-9EF30D2C5335}"/>
               </a:ext>
             </a:extLst>
           </p:cNvPr>
@@ -8041,7 +7993,7 @@
           <p:cNvPr id="2" name="Title 1">
             <a:extLst>
               <a:ext uri="{FF2B5EF4-FFF2-40B4-BE49-F238E27FC236}">
-                <a16:creationId xmlns="" xmlns:a16="http://schemas.microsoft.com/office/drawing/2014/main" id="{8D358425-7236-4D9A-B30B-659AD4BA68DD}"/>
+                <a16:creationId xmlns:a16="http://schemas.microsoft.com/office/drawing/2014/main" id="{8D358425-7236-4D9A-B30B-659AD4BA68DD}"/>
               </a:ext>
             </a:extLst>
           </p:cNvPr>
@@ -8085,7 +8037,7 @@
           <p:cNvPr id="7" name="Content Placeholder 6" descr="See page 60 in book" title="See slide title">
             <a:extLst>
               <a:ext uri="{FF2B5EF4-FFF2-40B4-BE49-F238E27FC236}">
-                <a16:creationId xmlns="" xmlns:a16="http://schemas.microsoft.com/office/drawing/2014/main" id="{4CEF3E6E-845A-4BD2-86B0-BDE848D01C7B}"/>
+                <a16:creationId xmlns:a16="http://schemas.microsoft.com/office/drawing/2014/main" id="{4CEF3E6E-845A-4BD2-86B0-BDE848D01C7B}"/>
               </a:ext>
             </a:extLst>
           </p:cNvPr>
@@ -8123,7 +8075,7 @@
           <p:cNvPr id="4" name="Date Placeholder 3">
             <a:extLst>
               <a:ext uri="{FF2B5EF4-FFF2-40B4-BE49-F238E27FC236}">
-                <a16:creationId xmlns="" xmlns:a16="http://schemas.microsoft.com/office/drawing/2014/main" id="{C3AE0141-6AD6-4B8D-8759-AF0885B94650}"/>
+                <a16:creationId xmlns:a16="http://schemas.microsoft.com/office/drawing/2014/main" id="{C3AE0141-6AD6-4B8D-8759-AF0885B94650}"/>
               </a:ext>
             </a:extLst>
           </p:cNvPr>
@@ -8155,7 +8107,7 @@
           <p:cNvPr id="5" name="Footer Placeholder 4">
             <a:extLst>
               <a:ext uri="{FF2B5EF4-FFF2-40B4-BE49-F238E27FC236}">
-                <a16:creationId xmlns="" xmlns:a16="http://schemas.microsoft.com/office/drawing/2014/main" id="{FA582294-EDD1-4D80-B48F-9388CE4B1AC3}"/>
+                <a16:creationId xmlns:a16="http://schemas.microsoft.com/office/drawing/2014/main" id="{FA582294-EDD1-4D80-B48F-9388CE4B1AC3}"/>
               </a:ext>
             </a:extLst>
           </p:cNvPr>
@@ -8187,7 +8139,7 @@
           <p:cNvPr id="6" name="Slide Number Placeholder 5">
             <a:extLst>
               <a:ext uri="{FF2B5EF4-FFF2-40B4-BE49-F238E27FC236}">
-                <a16:creationId xmlns="" xmlns:a16="http://schemas.microsoft.com/office/drawing/2014/main" id="{BFF618CC-9983-4DD8-99E0-B8EDDDDE80E3}"/>
+                <a16:creationId xmlns:a16="http://schemas.microsoft.com/office/drawing/2014/main" id="{BFF618CC-9983-4DD8-99E0-B8EDDDDE80E3}"/>
               </a:ext>
             </a:extLst>
           </p:cNvPr>
@@ -8276,7 +8228,7 @@
           <p:cNvPr id="2" name="Title 1">
             <a:extLst>
               <a:ext uri="{FF2B5EF4-FFF2-40B4-BE49-F238E27FC236}">
-                <a16:creationId xmlns="" xmlns:a16="http://schemas.microsoft.com/office/drawing/2014/main" id="{92A211AE-B547-4D98-98A9-47E8254E19D3}"/>
+                <a16:creationId xmlns:a16="http://schemas.microsoft.com/office/drawing/2014/main" id="{92A211AE-B547-4D98-98A9-47E8254E19D3}"/>
               </a:ext>
             </a:extLst>
           </p:cNvPr>
@@ -8320,7 +8272,7 @@
           <p:cNvPr id="3" name="Text Placeholder 2">
             <a:extLst>
               <a:ext uri="{FF2B5EF4-FFF2-40B4-BE49-F238E27FC236}">
-                <a16:creationId xmlns="" xmlns:a16="http://schemas.microsoft.com/office/drawing/2014/main" id="{14E7CCBF-8298-4288-BB50-7D22994B1B21}"/>
+                <a16:creationId xmlns:a16="http://schemas.microsoft.com/office/drawing/2014/main" id="{14E7CCBF-8298-4288-BB50-7D22994B1B21}"/>
               </a:ext>
             </a:extLst>
           </p:cNvPr>
@@ -8546,7 +8498,7 @@
           <p:cNvPr id="4" name="Date Placeholder 3">
             <a:extLst>
               <a:ext uri="{FF2B5EF4-FFF2-40B4-BE49-F238E27FC236}">
-                <a16:creationId xmlns="" xmlns:a16="http://schemas.microsoft.com/office/drawing/2014/main" id="{8CB08FB3-CB63-457A-8F81-8AEBAB8F5177}"/>
+                <a16:creationId xmlns:a16="http://schemas.microsoft.com/office/drawing/2014/main" id="{8CB08FB3-CB63-457A-8F81-8AEBAB8F5177}"/>
               </a:ext>
             </a:extLst>
           </p:cNvPr>
@@ -8578,7 +8530,7 @@
           <p:cNvPr id="5" name="Footer Placeholder 4">
             <a:extLst>
               <a:ext uri="{FF2B5EF4-FFF2-40B4-BE49-F238E27FC236}">
-                <a16:creationId xmlns="" xmlns:a16="http://schemas.microsoft.com/office/drawing/2014/main" id="{3B69616A-0268-4C55-8B72-B75B738B9095}"/>
+                <a16:creationId xmlns:a16="http://schemas.microsoft.com/office/drawing/2014/main" id="{3B69616A-0268-4C55-8B72-B75B738B9095}"/>
               </a:ext>
             </a:extLst>
           </p:cNvPr>
@@ -8610,7 +8562,7 @@
           <p:cNvPr id="6" name="Slide Number Placeholder 5">
             <a:extLst>
               <a:ext uri="{FF2B5EF4-FFF2-40B4-BE49-F238E27FC236}">
-                <a16:creationId xmlns="" xmlns:a16="http://schemas.microsoft.com/office/drawing/2014/main" id="{DC3558FE-610C-405D-9BF6-2FC0D38694D6}"/>
+                <a16:creationId xmlns:a16="http://schemas.microsoft.com/office/drawing/2014/main" id="{DC3558FE-610C-405D-9BF6-2FC0D38694D6}"/>
               </a:ext>
             </a:extLst>
           </p:cNvPr>
@@ -8699,7 +8651,7 @@
           <p:cNvPr id="2" name="Title 1">
             <a:extLst>
               <a:ext uri="{FF2B5EF4-FFF2-40B4-BE49-F238E27FC236}">
-                <a16:creationId xmlns="" xmlns:a16="http://schemas.microsoft.com/office/drawing/2014/main" id="{04382C41-BF51-431A-B81D-FBEDFC0DF0F7}"/>
+                <a16:creationId xmlns:a16="http://schemas.microsoft.com/office/drawing/2014/main" id="{04382C41-BF51-431A-B81D-FBEDFC0DF0F7}"/>
               </a:ext>
             </a:extLst>
           </p:cNvPr>
@@ -8743,7 +8695,7 @@
           <p:cNvPr id="7" name="Content Placeholder 6" descr="See page 62 in book" title="See slide title">
             <a:extLst>
               <a:ext uri="{FF2B5EF4-FFF2-40B4-BE49-F238E27FC236}">
-                <a16:creationId xmlns="" xmlns:a16="http://schemas.microsoft.com/office/drawing/2014/main" id="{6282B405-9CDC-4C72-B85E-6D9C585D97A8}"/>
+                <a16:creationId xmlns:a16="http://schemas.microsoft.com/office/drawing/2014/main" id="{6282B405-9CDC-4C72-B85E-6D9C585D97A8}"/>
               </a:ext>
             </a:extLst>
           </p:cNvPr>
@@ -8781,7 +8733,7 @@
           <p:cNvPr id="4" name="Date Placeholder 3">
             <a:extLst>
               <a:ext uri="{FF2B5EF4-FFF2-40B4-BE49-F238E27FC236}">
-                <a16:creationId xmlns="" xmlns:a16="http://schemas.microsoft.com/office/drawing/2014/main" id="{8534757D-E37D-4E53-9912-965B6529071C}"/>
+                <a16:creationId xmlns:a16="http://schemas.microsoft.com/office/drawing/2014/main" id="{8534757D-E37D-4E53-9912-965B6529071C}"/>
               </a:ext>
             </a:extLst>
           </p:cNvPr>
@@ -8813,7 +8765,7 @@
           <p:cNvPr id="5" name="Footer Placeholder 4">
             <a:extLst>
               <a:ext uri="{FF2B5EF4-FFF2-40B4-BE49-F238E27FC236}">
-                <a16:creationId xmlns="" xmlns:a16="http://schemas.microsoft.com/office/drawing/2014/main" id="{AFCB42AA-52CE-4704-B38C-E2E2224D426F}"/>
+                <a16:creationId xmlns:a16="http://schemas.microsoft.com/office/drawing/2014/main" id="{AFCB42AA-52CE-4704-B38C-E2E2224D426F}"/>
               </a:ext>
             </a:extLst>
           </p:cNvPr>
@@ -8845,7 +8797,7 @@
           <p:cNvPr id="6" name="Slide Number Placeholder 5">
             <a:extLst>
               <a:ext uri="{FF2B5EF4-FFF2-40B4-BE49-F238E27FC236}">
-                <a16:creationId xmlns="" xmlns:a16="http://schemas.microsoft.com/office/drawing/2014/main" id="{174FD9E2-739E-4EF7-B15D-47402DF95980}"/>
+                <a16:creationId xmlns:a16="http://schemas.microsoft.com/office/drawing/2014/main" id="{174FD9E2-739E-4EF7-B15D-47402DF95980}"/>
               </a:ext>
             </a:extLst>
           </p:cNvPr>
@@ -8934,7 +8886,7 @@
           <p:cNvPr id="2" name="Title 1">
             <a:extLst>
               <a:ext uri="{FF2B5EF4-FFF2-40B4-BE49-F238E27FC236}">
-                <a16:creationId xmlns="" xmlns:a16="http://schemas.microsoft.com/office/drawing/2014/main" id="{34049DEB-E19B-4C6E-B04D-8E6094ED7F1F}"/>
+                <a16:creationId xmlns:a16="http://schemas.microsoft.com/office/drawing/2014/main" id="{34049DEB-E19B-4C6E-B04D-8E6094ED7F1F}"/>
               </a:ext>
             </a:extLst>
           </p:cNvPr>
@@ -8978,7 +8930,7 @@
           <p:cNvPr id="7" name="Content Placeholder 6" descr="See page 64 in book" title="See slide title ">
             <a:extLst>
               <a:ext uri="{FF2B5EF4-FFF2-40B4-BE49-F238E27FC236}">
-                <a16:creationId xmlns="" xmlns:a16="http://schemas.microsoft.com/office/drawing/2014/main" id="{A7F7D82A-E15B-4E25-AB5E-8D506418ECE0}"/>
+                <a16:creationId xmlns:a16="http://schemas.microsoft.com/office/drawing/2014/main" id="{A7F7D82A-E15B-4E25-AB5E-8D506418ECE0}"/>
               </a:ext>
             </a:extLst>
           </p:cNvPr>
@@ -9016,7 +8968,7 @@
           <p:cNvPr id="4" name="Date Placeholder 3">
             <a:extLst>
               <a:ext uri="{FF2B5EF4-FFF2-40B4-BE49-F238E27FC236}">
-                <a16:creationId xmlns="" xmlns:a16="http://schemas.microsoft.com/office/drawing/2014/main" id="{683562F6-9409-436F-B9F2-0618C3FA088D}"/>
+                <a16:creationId xmlns:a16="http://schemas.microsoft.com/office/drawing/2014/main" id="{683562F6-9409-436F-B9F2-0618C3FA088D}"/>
               </a:ext>
             </a:extLst>
           </p:cNvPr>
@@ -9048,7 +9000,7 @@
           <p:cNvPr id="5" name="Footer Placeholder 4">
             <a:extLst>
               <a:ext uri="{FF2B5EF4-FFF2-40B4-BE49-F238E27FC236}">
-                <a16:creationId xmlns="" xmlns:a16="http://schemas.microsoft.com/office/drawing/2014/main" id="{01BD6CE1-3637-4376-8C76-6A24A2F472DB}"/>
+                <a16:creationId xmlns:a16="http://schemas.microsoft.com/office/drawing/2014/main" id="{01BD6CE1-3637-4376-8C76-6A24A2F472DB}"/>
               </a:ext>
             </a:extLst>
           </p:cNvPr>
@@ -9080,7 +9032,7 @@
           <p:cNvPr id="6" name="Slide Number Placeholder 5">
             <a:extLst>
               <a:ext uri="{FF2B5EF4-FFF2-40B4-BE49-F238E27FC236}">
-                <a16:creationId xmlns="" xmlns:a16="http://schemas.microsoft.com/office/drawing/2014/main" id="{B0D9B89B-627F-4917-87DE-39FFFADCA479}"/>
+                <a16:creationId xmlns:a16="http://schemas.microsoft.com/office/drawing/2014/main" id="{B0D9B89B-627F-4917-87DE-39FFFADCA479}"/>
               </a:ext>
             </a:extLst>
           </p:cNvPr>
@@ -9169,7 +9121,7 @@
           <p:cNvPr id="2" name="Title 1">
             <a:extLst>
               <a:ext uri="{FF2B5EF4-FFF2-40B4-BE49-F238E27FC236}">
-                <a16:creationId xmlns="" xmlns:a16="http://schemas.microsoft.com/office/drawing/2014/main" id="{1C569E5D-602C-4186-8AB4-A74FE1B4BCE2}"/>
+                <a16:creationId xmlns:a16="http://schemas.microsoft.com/office/drawing/2014/main" id="{1C569E5D-602C-4186-8AB4-A74FE1B4BCE2}"/>
               </a:ext>
             </a:extLst>
           </p:cNvPr>
@@ -9213,7 +9165,7 @@
           <p:cNvPr id="7" name="Content Placeholder 6" descr="See page 66 in book" title="See slide title">
             <a:extLst>
               <a:ext uri="{FF2B5EF4-FFF2-40B4-BE49-F238E27FC236}">
-                <a16:creationId xmlns="" xmlns:a16="http://schemas.microsoft.com/office/drawing/2014/main" id="{CD05DD04-D0EA-4ABA-BDC6-9D8CA205F14A}"/>
+                <a16:creationId xmlns:a16="http://schemas.microsoft.com/office/drawing/2014/main" id="{CD05DD04-D0EA-4ABA-BDC6-9D8CA205F14A}"/>
               </a:ext>
             </a:extLst>
           </p:cNvPr>
@@ -9251,7 +9203,7 @@
           <p:cNvPr id="4" name="Date Placeholder 3">
             <a:extLst>
               <a:ext uri="{FF2B5EF4-FFF2-40B4-BE49-F238E27FC236}">
-                <a16:creationId xmlns="" xmlns:a16="http://schemas.microsoft.com/office/drawing/2014/main" id="{D9FACDD2-45F6-4FBA-BA4C-CFAD809498FD}"/>
+                <a16:creationId xmlns:a16="http://schemas.microsoft.com/office/drawing/2014/main" id="{D9FACDD2-45F6-4FBA-BA4C-CFAD809498FD}"/>
               </a:ext>
             </a:extLst>
           </p:cNvPr>
@@ -9283,7 +9235,7 @@
           <p:cNvPr id="5" name="Footer Placeholder 4">
             <a:extLst>
               <a:ext uri="{FF2B5EF4-FFF2-40B4-BE49-F238E27FC236}">
-                <a16:creationId xmlns="" xmlns:a16="http://schemas.microsoft.com/office/drawing/2014/main" id="{75C4E23C-8DC2-47A7-A106-9C8FA3795EDA}"/>
+                <a16:creationId xmlns:a16="http://schemas.microsoft.com/office/drawing/2014/main" id="{75C4E23C-8DC2-47A7-A106-9C8FA3795EDA}"/>
               </a:ext>
             </a:extLst>
           </p:cNvPr>
@@ -9315,7 +9267,7 @@
           <p:cNvPr id="6" name="Slide Number Placeholder 5">
             <a:extLst>
               <a:ext uri="{FF2B5EF4-FFF2-40B4-BE49-F238E27FC236}">
-                <a16:creationId xmlns="" xmlns:a16="http://schemas.microsoft.com/office/drawing/2014/main" id="{A89AC208-22E4-495B-9569-DD0131A3BFAC}"/>
+                <a16:creationId xmlns:a16="http://schemas.microsoft.com/office/drawing/2014/main" id="{A89AC208-22E4-495B-9569-DD0131A3BFAC}"/>
               </a:ext>
             </a:extLst>
           </p:cNvPr>
@@ -9404,7 +9356,7 @@
           <p:cNvPr id="2" name="Title 1">
             <a:extLst>
               <a:ext uri="{FF2B5EF4-FFF2-40B4-BE49-F238E27FC236}">
-                <a16:creationId xmlns="" xmlns:a16="http://schemas.microsoft.com/office/drawing/2014/main" id="{B3736D8B-987D-4511-B105-67FD97791C19}"/>
+                <a16:creationId xmlns:a16="http://schemas.microsoft.com/office/drawing/2014/main" id="{B3736D8B-987D-4511-B105-67FD97791C19}"/>
               </a:ext>
             </a:extLst>
           </p:cNvPr>
@@ -9453,7 +9405,7 @@
           <p:cNvPr id="3" name="Text Placeholder 2">
             <a:extLst>
               <a:ext uri="{FF2B5EF4-FFF2-40B4-BE49-F238E27FC236}">
-                <a16:creationId xmlns="" xmlns:a16="http://schemas.microsoft.com/office/drawing/2014/main" id="{D0798CF0-3FD2-409C-9EC1-51121463AD5E}"/>
+                <a16:creationId xmlns:a16="http://schemas.microsoft.com/office/drawing/2014/main" id="{D0798CF0-3FD2-409C-9EC1-51121463AD5E}"/>
               </a:ext>
             </a:extLst>
           </p:cNvPr>
@@ -9692,7 +9644,7 @@
           <p:cNvPr id="4" name="Date Placeholder 3">
             <a:extLst>
               <a:ext uri="{FF2B5EF4-FFF2-40B4-BE49-F238E27FC236}">
-                <a16:creationId xmlns="" xmlns:a16="http://schemas.microsoft.com/office/drawing/2014/main" id="{2C712694-8B36-4905-8793-44B45A3621DC}"/>
+                <a16:creationId xmlns:a16="http://schemas.microsoft.com/office/drawing/2014/main" id="{2C712694-8B36-4905-8793-44B45A3621DC}"/>
               </a:ext>
             </a:extLst>
           </p:cNvPr>
@@ -9724,7 +9676,7 @@
           <p:cNvPr id="5" name="Footer Placeholder 4">
             <a:extLst>
               <a:ext uri="{FF2B5EF4-FFF2-40B4-BE49-F238E27FC236}">
-                <a16:creationId xmlns="" xmlns:a16="http://schemas.microsoft.com/office/drawing/2014/main" id="{F4480BBE-77B1-4E06-8142-1484F613E3FC}"/>
+                <a16:creationId xmlns:a16="http://schemas.microsoft.com/office/drawing/2014/main" id="{F4480BBE-77B1-4E06-8142-1484F613E3FC}"/>
               </a:ext>
             </a:extLst>
           </p:cNvPr>
@@ -9756,7 +9708,7 @@
           <p:cNvPr id="6" name="Slide Number Placeholder 5">
             <a:extLst>
               <a:ext uri="{FF2B5EF4-FFF2-40B4-BE49-F238E27FC236}">
-                <a16:creationId xmlns="" xmlns:a16="http://schemas.microsoft.com/office/drawing/2014/main" id="{93DD2926-C4C8-4A5B-A02B-5897C1BBFFBB}"/>
+                <a16:creationId xmlns:a16="http://schemas.microsoft.com/office/drawing/2014/main" id="{93DD2926-C4C8-4A5B-A02B-5897C1BBFFBB}"/>
               </a:ext>
             </a:extLst>
           </p:cNvPr>
@@ -9845,7 +9797,7 @@
           <p:cNvPr id="2" name="Title 1">
             <a:extLst>
               <a:ext uri="{FF2B5EF4-FFF2-40B4-BE49-F238E27FC236}">
-                <a16:creationId xmlns="" xmlns:a16="http://schemas.microsoft.com/office/drawing/2014/main" id="{FD89D948-07CA-486C-955D-A169118079DB}"/>
+                <a16:creationId xmlns:a16="http://schemas.microsoft.com/office/drawing/2014/main" id="{FD89D948-07CA-486C-955D-A169118079DB}"/>
               </a:ext>
             </a:extLst>
           </p:cNvPr>
@@ -9889,7 +9841,7 @@
           <p:cNvPr id="7" name="Content Placeholder 6" descr="See page 68 in book" title="See slide title">
             <a:extLst>
               <a:ext uri="{FF2B5EF4-FFF2-40B4-BE49-F238E27FC236}">
-                <a16:creationId xmlns="" xmlns:a16="http://schemas.microsoft.com/office/drawing/2014/main" id="{E66060D2-00C2-4CA1-B6CF-5B848FF9F7E3}"/>
+                <a16:creationId xmlns:a16="http://schemas.microsoft.com/office/drawing/2014/main" id="{E66060D2-00C2-4CA1-B6CF-5B848FF9F7E3}"/>
               </a:ext>
             </a:extLst>
           </p:cNvPr>
@@ -9932,7 +9884,7 @@
           <p:cNvPr id="4" name="Date Placeholder 3">
             <a:extLst>
               <a:ext uri="{FF2B5EF4-FFF2-40B4-BE49-F238E27FC236}">
-                <a16:creationId xmlns="" xmlns:a16="http://schemas.microsoft.com/office/drawing/2014/main" id="{340027AA-390F-491E-A0E3-D9F5016F89B0}"/>
+                <a16:creationId xmlns:a16="http://schemas.microsoft.com/office/drawing/2014/main" id="{340027AA-390F-491E-A0E3-D9F5016F89B0}"/>
               </a:ext>
             </a:extLst>
           </p:cNvPr>
@@ -9964,7 +9916,7 @@
           <p:cNvPr id="5" name="Footer Placeholder 4">
             <a:extLst>
               <a:ext uri="{FF2B5EF4-FFF2-40B4-BE49-F238E27FC236}">
-                <a16:creationId xmlns="" xmlns:a16="http://schemas.microsoft.com/office/drawing/2014/main" id="{AF8CB816-6C8F-4C3E-AD07-087ECDF05E89}"/>
+                <a16:creationId xmlns:a16="http://schemas.microsoft.com/office/drawing/2014/main" id="{AF8CB816-6C8F-4C3E-AD07-087ECDF05E89}"/>
               </a:ext>
             </a:extLst>
           </p:cNvPr>
@@ -9996,7 +9948,7 @@
           <p:cNvPr id="6" name="Slide Number Placeholder 5">
             <a:extLst>
               <a:ext uri="{FF2B5EF4-FFF2-40B4-BE49-F238E27FC236}">
-                <a16:creationId xmlns="" xmlns:a16="http://schemas.microsoft.com/office/drawing/2014/main" id="{17A17334-2E50-49AB-8E25-7DA7E22D6787}"/>
+                <a16:creationId xmlns:a16="http://schemas.microsoft.com/office/drawing/2014/main" id="{17A17334-2E50-49AB-8E25-7DA7E22D6787}"/>
               </a:ext>
             </a:extLst>
           </p:cNvPr>
@@ -10085,7 +10037,7 @@
           <p:cNvPr id="2" name="Title 1">
             <a:extLst>
               <a:ext uri="{FF2B5EF4-FFF2-40B4-BE49-F238E27FC236}">
-                <a16:creationId xmlns="" xmlns:a16="http://schemas.microsoft.com/office/drawing/2014/main" id="{E4437D59-4E86-4AAA-A683-E049AE5791E7}"/>
+                <a16:creationId xmlns:a16="http://schemas.microsoft.com/office/drawing/2014/main" id="{E4437D59-4E86-4AAA-A683-E049AE5791E7}"/>
               </a:ext>
             </a:extLst>
           </p:cNvPr>
@@ -10113,7 +10065,7 @@
           <p:cNvPr id="7" name="Content Placeholder 6" descr="See page 70 in book" title="See slide title">
             <a:extLst>
               <a:ext uri="{FF2B5EF4-FFF2-40B4-BE49-F238E27FC236}">
-                <a16:creationId xmlns="" xmlns:a16="http://schemas.microsoft.com/office/drawing/2014/main" id="{26C63B44-34BD-472F-A7FE-47226671E954}"/>
+                <a16:creationId xmlns:a16="http://schemas.microsoft.com/office/drawing/2014/main" id="{26C63B44-34BD-472F-A7FE-47226671E954}"/>
               </a:ext>
             </a:extLst>
           </p:cNvPr>
@@ -10151,7 +10103,7 @@
           <p:cNvPr id="4" name="Date Placeholder 3">
             <a:extLst>
               <a:ext uri="{FF2B5EF4-FFF2-40B4-BE49-F238E27FC236}">
-                <a16:creationId xmlns="" xmlns:a16="http://schemas.microsoft.com/office/drawing/2014/main" id="{3C43D972-7841-4EDE-BB6B-567E145E0723}"/>
+                <a16:creationId xmlns:a16="http://schemas.microsoft.com/office/drawing/2014/main" id="{3C43D972-7841-4EDE-BB6B-567E145E0723}"/>
               </a:ext>
             </a:extLst>
           </p:cNvPr>
@@ -10183,7 +10135,7 @@
           <p:cNvPr id="5" name="Footer Placeholder 4">
             <a:extLst>
               <a:ext uri="{FF2B5EF4-FFF2-40B4-BE49-F238E27FC236}">
-                <a16:creationId xmlns="" xmlns:a16="http://schemas.microsoft.com/office/drawing/2014/main" id="{E0688BE1-EF9D-4C9F-98D7-766C28FD0A88}"/>
+                <a16:creationId xmlns:a16="http://schemas.microsoft.com/office/drawing/2014/main" id="{E0688BE1-EF9D-4C9F-98D7-766C28FD0A88}"/>
               </a:ext>
             </a:extLst>
           </p:cNvPr>
@@ -10215,7 +10167,7 @@
           <p:cNvPr id="6" name="Slide Number Placeholder 5">
             <a:extLst>
               <a:ext uri="{FF2B5EF4-FFF2-40B4-BE49-F238E27FC236}">
-                <a16:creationId xmlns="" xmlns:a16="http://schemas.microsoft.com/office/drawing/2014/main" id="{813454B6-3A65-49FB-AA0A-D774C09C21DB}"/>
+                <a16:creationId xmlns:a16="http://schemas.microsoft.com/office/drawing/2014/main" id="{813454B6-3A65-49FB-AA0A-D774C09C21DB}"/>
               </a:ext>
             </a:extLst>
           </p:cNvPr>
@@ -10304,7 +10256,7 @@
           <p:cNvPr id="2" name="Title 1">
             <a:extLst>
               <a:ext uri="{FF2B5EF4-FFF2-40B4-BE49-F238E27FC236}">
-                <a16:creationId xmlns="" xmlns:a16="http://schemas.microsoft.com/office/drawing/2014/main" id="{744D365C-CC14-4B9B-A6AF-FEB76E40B195}"/>
+                <a16:creationId xmlns:a16="http://schemas.microsoft.com/office/drawing/2014/main" id="{744D365C-CC14-4B9B-A6AF-FEB76E40B195}"/>
               </a:ext>
             </a:extLst>
           </p:cNvPr>
@@ -10348,7 +10300,7 @@
           <p:cNvPr id="7" name="Content Placeholder 6" descr="See page 70 in book" title="See slide title">
             <a:extLst>
               <a:ext uri="{FF2B5EF4-FFF2-40B4-BE49-F238E27FC236}">
-                <a16:creationId xmlns="" xmlns:a16="http://schemas.microsoft.com/office/drawing/2014/main" id="{1E679D25-0816-4B05-A752-49C17B6EECBD}"/>
+                <a16:creationId xmlns:a16="http://schemas.microsoft.com/office/drawing/2014/main" id="{1E679D25-0816-4B05-A752-49C17B6EECBD}"/>
               </a:ext>
             </a:extLst>
           </p:cNvPr>
@@ -10386,7 +10338,7 @@
           <p:cNvPr id="4" name="Date Placeholder 3">
             <a:extLst>
               <a:ext uri="{FF2B5EF4-FFF2-40B4-BE49-F238E27FC236}">
-                <a16:creationId xmlns="" xmlns:a16="http://schemas.microsoft.com/office/drawing/2014/main" id="{77007CBA-2D1B-4A50-A859-21FA6196F175}"/>
+                <a16:creationId xmlns:a16="http://schemas.microsoft.com/office/drawing/2014/main" id="{77007CBA-2D1B-4A50-A859-21FA6196F175}"/>
               </a:ext>
             </a:extLst>
           </p:cNvPr>
@@ -10418,7 +10370,7 @@
           <p:cNvPr id="5" name="Footer Placeholder 4">
             <a:extLst>
               <a:ext uri="{FF2B5EF4-FFF2-40B4-BE49-F238E27FC236}">
-                <a16:creationId xmlns="" xmlns:a16="http://schemas.microsoft.com/office/drawing/2014/main" id="{FCA4B44C-7921-4033-AC98-DE2D5D798853}"/>
+                <a16:creationId xmlns:a16="http://schemas.microsoft.com/office/drawing/2014/main" id="{FCA4B44C-7921-4033-AC98-DE2D5D798853}"/>
               </a:ext>
             </a:extLst>
           </p:cNvPr>
@@ -10450,7 +10402,7 @@
           <p:cNvPr id="6" name="Slide Number Placeholder 5">
             <a:extLst>
               <a:ext uri="{FF2B5EF4-FFF2-40B4-BE49-F238E27FC236}">
-                <a16:creationId xmlns="" xmlns:a16="http://schemas.microsoft.com/office/drawing/2014/main" id="{B74C1A37-CBF4-4CCC-8E72-2E59C61714C7}"/>
+                <a16:creationId xmlns:a16="http://schemas.microsoft.com/office/drawing/2014/main" id="{B74C1A37-CBF4-4CCC-8E72-2E59C61714C7}"/>
               </a:ext>
             </a:extLst>
           </p:cNvPr>
@@ -10539,7 +10491,7 @@
           <p:cNvPr id="2" name="Title 1">
             <a:extLst>
               <a:ext uri="{FF2B5EF4-FFF2-40B4-BE49-F238E27FC236}">
-                <a16:creationId xmlns="" xmlns:a16="http://schemas.microsoft.com/office/drawing/2014/main" id="{E7A93399-FF3B-45B0-948B-6F351A746E8E}"/>
+                <a16:creationId xmlns:a16="http://schemas.microsoft.com/office/drawing/2014/main" id="{E7A93399-FF3B-45B0-948B-6F351A746E8E}"/>
               </a:ext>
             </a:extLst>
           </p:cNvPr>
@@ -10603,7 +10555,7 @@
           <p:cNvPr id="3" name="Text Placeholder 2">
             <a:extLst>
               <a:ext uri="{FF2B5EF4-FFF2-40B4-BE49-F238E27FC236}">
-                <a16:creationId xmlns="" xmlns:a16="http://schemas.microsoft.com/office/drawing/2014/main" id="{AF0FDA1E-BFE6-4047-A637-91F716B089B6}"/>
+                <a16:creationId xmlns:a16="http://schemas.microsoft.com/office/drawing/2014/main" id="{AF0FDA1E-BFE6-4047-A637-91F716B089B6}"/>
               </a:ext>
             </a:extLst>
           </p:cNvPr>
@@ -10719,7 +10671,7 @@
           <p:cNvPr id="4" name="Date Placeholder 3">
             <a:extLst>
               <a:ext uri="{FF2B5EF4-FFF2-40B4-BE49-F238E27FC236}">
-                <a16:creationId xmlns="" xmlns:a16="http://schemas.microsoft.com/office/drawing/2014/main" id="{ADD76F5A-0B6D-4EA4-BFCD-3D93383F88D8}"/>
+                <a16:creationId xmlns:a16="http://schemas.microsoft.com/office/drawing/2014/main" id="{ADD76F5A-0B6D-4EA4-BFCD-3D93383F88D8}"/>
               </a:ext>
             </a:extLst>
           </p:cNvPr>
@@ -10751,7 +10703,7 @@
           <p:cNvPr id="5" name="Footer Placeholder 4">
             <a:extLst>
               <a:ext uri="{FF2B5EF4-FFF2-40B4-BE49-F238E27FC236}">
-                <a16:creationId xmlns="" xmlns:a16="http://schemas.microsoft.com/office/drawing/2014/main" id="{36FB5C11-55F9-4146-B780-52FCDA09BC43}"/>
+                <a16:creationId xmlns:a16="http://schemas.microsoft.com/office/drawing/2014/main" id="{36FB5C11-55F9-4146-B780-52FCDA09BC43}"/>
               </a:ext>
             </a:extLst>
           </p:cNvPr>
@@ -10783,7 +10735,7 @@
           <p:cNvPr id="6" name="Slide Number Placeholder 5">
             <a:extLst>
               <a:ext uri="{FF2B5EF4-FFF2-40B4-BE49-F238E27FC236}">
-                <a16:creationId xmlns="" xmlns:a16="http://schemas.microsoft.com/office/drawing/2014/main" id="{4BDC6FD8-110C-43E1-AA02-C0940ACFF626}"/>
+                <a16:creationId xmlns:a16="http://schemas.microsoft.com/office/drawing/2014/main" id="{4BDC6FD8-110C-43E1-AA02-C0940ACFF626}"/>
               </a:ext>
             </a:extLst>
           </p:cNvPr>
@@ -10872,7 +10824,7 @@
           <p:cNvPr id="2" name="Title 1">
             <a:extLst>
               <a:ext uri="{FF2B5EF4-FFF2-40B4-BE49-F238E27FC236}">
-                <a16:creationId xmlns="" xmlns:a16="http://schemas.microsoft.com/office/drawing/2014/main" id="{F27749F6-A2AA-4356-B44D-A5EE68857B1A}"/>
+                <a16:creationId xmlns:a16="http://schemas.microsoft.com/office/drawing/2014/main" id="{F27749F6-A2AA-4356-B44D-A5EE68857B1A}"/>
               </a:ext>
             </a:extLst>
           </p:cNvPr>
@@ -10912,7 +10864,7 @@
           <p:cNvPr id="3" name="Text Placeholder 2">
             <a:extLst>
               <a:ext uri="{FF2B5EF4-FFF2-40B4-BE49-F238E27FC236}">
-                <a16:creationId xmlns="" xmlns:a16="http://schemas.microsoft.com/office/drawing/2014/main" id="{CF012B71-75DA-452E-AD5E-95B8713462C6}"/>
+                <a16:creationId xmlns:a16="http://schemas.microsoft.com/office/drawing/2014/main" id="{CF012B71-75DA-452E-AD5E-95B8713462C6}"/>
               </a:ext>
             </a:extLst>
           </p:cNvPr>
@@ -10961,7 +10913,7 @@
           <p:cNvPr id="4" name="Date Placeholder 3">
             <a:extLst>
               <a:ext uri="{FF2B5EF4-FFF2-40B4-BE49-F238E27FC236}">
-                <a16:creationId xmlns="" xmlns:a16="http://schemas.microsoft.com/office/drawing/2014/main" id="{EB60A05A-215C-4458-8657-B1E3174EA4D1}"/>
+                <a16:creationId xmlns:a16="http://schemas.microsoft.com/office/drawing/2014/main" id="{EB60A05A-215C-4458-8657-B1E3174EA4D1}"/>
               </a:ext>
             </a:extLst>
           </p:cNvPr>
@@ -10993,7 +10945,7 @@
           <p:cNvPr id="5" name="Footer Placeholder 4">
             <a:extLst>
               <a:ext uri="{FF2B5EF4-FFF2-40B4-BE49-F238E27FC236}">
-                <a16:creationId xmlns="" xmlns:a16="http://schemas.microsoft.com/office/drawing/2014/main" id="{CCC7CD15-51D0-4584-AC21-F9672F8444B3}"/>
+                <a16:creationId xmlns:a16="http://schemas.microsoft.com/office/drawing/2014/main" id="{CCC7CD15-51D0-4584-AC21-F9672F8444B3}"/>
               </a:ext>
             </a:extLst>
           </p:cNvPr>
@@ -11025,7 +10977,7 @@
           <p:cNvPr id="6" name="Slide Number Placeholder 5">
             <a:extLst>
               <a:ext uri="{FF2B5EF4-FFF2-40B4-BE49-F238E27FC236}">
-                <a16:creationId xmlns="" xmlns:a16="http://schemas.microsoft.com/office/drawing/2014/main" id="{1618450E-21F8-481C-A801-593045C3F764}"/>
+                <a16:creationId xmlns:a16="http://schemas.microsoft.com/office/drawing/2014/main" id="{1618450E-21F8-481C-A801-593045C3F764}"/>
               </a:ext>
             </a:extLst>
           </p:cNvPr>
@@ -11114,7 +11066,7 @@
           <p:cNvPr id="2" name="Title 1">
             <a:extLst>
               <a:ext uri="{FF2B5EF4-FFF2-40B4-BE49-F238E27FC236}">
-                <a16:creationId xmlns="" xmlns:a16="http://schemas.microsoft.com/office/drawing/2014/main" id="{83542EC6-2435-4E9E-BBFA-3943F8C597AF}"/>
+                <a16:creationId xmlns:a16="http://schemas.microsoft.com/office/drawing/2014/main" id="{83542EC6-2435-4E9E-BBFA-3943F8C597AF}"/>
               </a:ext>
             </a:extLst>
           </p:cNvPr>
@@ -11158,7 +11110,7 @@
           <p:cNvPr id="3" name="Text Placeholder 2">
             <a:extLst>
               <a:ext uri="{FF2B5EF4-FFF2-40B4-BE49-F238E27FC236}">
-                <a16:creationId xmlns="" xmlns:a16="http://schemas.microsoft.com/office/drawing/2014/main" id="{09FAC487-2175-47A5-9EB6-AE08B9431C51}"/>
+                <a16:creationId xmlns:a16="http://schemas.microsoft.com/office/drawing/2014/main" id="{09FAC487-2175-47A5-9EB6-AE08B9431C51}"/>
               </a:ext>
             </a:extLst>
           </p:cNvPr>
@@ -11307,7 +11259,7 @@
           <p:cNvPr id="4" name="Date Placeholder 3">
             <a:extLst>
               <a:ext uri="{FF2B5EF4-FFF2-40B4-BE49-F238E27FC236}">
-                <a16:creationId xmlns="" xmlns:a16="http://schemas.microsoft.com/office/drawing/2014/main" id="{32093940-8125-4711-85F1-5DEE44A14F8A}"/>
+                <a16:creationId xmlns:a16="http://schemas.microsoft.com/office/drawing/2014/main" id="{32093940-8125-4711-85F1-5DEE44A14F8A}"/>
               </a:ext>
             </a:extLst>
           </p:cNvPr>
@@ -11339,7 +11291,7 @@
           <p:cNvPr id="5" name="Footer Placeholder 4">
             <a:extLst>
               <a:ext uri="{FF2B5EF4-FFF2-40B4-BE49-F238E27FC236}">
-                <a16:creationId xmlns="" xmlns:a16="http://schemas.microsoft.com/office/drawing/2014/main" id="{E4BD55C3-C31E-4972-AF6F-49B5B67845F1}"/>
+                <a16:creationId xmlns:a16="http://schemas.microsoft.com/office/drawing/2014/main" id="{E4BD55C3-C31E-4972-AF6F-49B5B67845F1}"/>
               </a:ext>
             </a:extLst>
           </p:cNvPr>
@@ -11371,7 +11323,7 @@
           <p:cNvPr id="6" name="Slide Number Placeholder 5">
             <a:extLst>
               <a:ext uri="{FF2B5EF4-FFF2-40B4-BE49-F238E27FC236}">
-                <a16:creationId xmlns="" xmlns:a16="http://schemas.microsoft.com/office/drawing/2014/main" id="{FECA8E30-C685-45A7-B526-AFDAB418B603}"/>
+                <a16:creationId xmlns:a16="http://schemas.microsoft.com/office/drawing/2014/main" id="{FECA8E30-C685-45A7-B526-AFDAB418B603}"/>
               </a:ext>
             </a:extLst>
           </p:cNvPr>
@@ -11460,7 +11412,7 @@
           <p:cNvPr id="2" name="Title 1">
             <a:extLst>
               <a:ext uri="{FF2B5EF4-FFF2-40B4-BE49-F238E27FC236}">
-                <a16:creationId xmlns="" xmlns:a16="http://schemas.microsoft.com/office/drawing/2014/main" id="{E8BE66FE-4D88-4B9E-AB32-F682FF72D268}"/>
+                <a16:creationId xmlns:a16="http://schemas.microsoft.com/office/drawing/2014/main" id="{E8BE66FE-4D88-4B9E-AB32-F682FF72D268}"/>
               </a:ext>
             </a:extLst>
           </p:cNvPr>
@@ -11504,7 +11456,7 @@
           <p:cNvPr id="3" name="Text Placeholder 2">
             <a:extLst>
               <a:ext uri="{FF2B5EF4-FFF2-40B4-BE49-F238E27FC236}">
-                <a16:creationId xmlns="" xmlns:a16="http://schemas.microsoft.com/office/drawing/2014/main" id="{9BB2C6AC-2DF3-4E61-A737-A14C18EEDF6D}"/>
+                <a16:creationId xmlns:a16="http://schemas.microsoft.com/office/drawing/2014/main" id="{9BB2C6AC-2DF3-4E61-A737-A14C18EEDF6D}"/>
               </a:ext>
             </a:extLst>
           </p:cNvPr>
@@ -11639,7 +11591,7 @@
           <p:cNvPr id="4" name="Date Placeholder 3">
             <a:extLst>
               <a:ext uri="{FF2B5EF4-FFF2-40B4-BE49-F238E27FC236}">
-                <a16:creationId xmlns="" xmlns:a16="http://schemas.microsoft.com/office/drawing/2014/main" id="{1902CD47-C3B4-4CBA-96BA-8AC40ED59DD6}"/>
+                <a16:creationId xmlns:a16="http://schemas.microsoft.com/office/drawing/2014/main" id="{1902CD47-C3B4-4CBA-96BA-8AC40ED59DD6}"/>
               </a:ext>
             </a:extLst>
           </p:cNvPr>
@@ -11671,7 +11623,7 @@
           <p:cNvPr id="5" name="Footer Placeholder 4">
             <a:extLst>
               <a:ext uri="{FF2B5EF4-FFF2-40B4-BE49-F238E27FC236}">
-                <a16:creationId xmlns="" xmlns:a16="http://schemas.microsoft.com/office/drawing/2014/main" id="{04907F47-D86D-4F45-8217-8AA9D2764F7E}"/>
+                <a16:creationId xmlns:a16="http://schemas.microsoft.com/office/drawing/2014/main" id="{04907F47-D86D-4F45-8217-8AA9D2764F7E}"/>
               </a:ext>
             </a:extLst>
           </p:cNvPr>
@@ -11703,7 +11655,7 @@
           <p:cNvPr id="6" name="Slide Number Placeholder 5">
             <a:extLst>
               <a:ext uri="{FF2B5EF4-FFF2-40B4-BE49-F238E27FC236}">
-                <a16:creationId xmlns="" xmlns:a16="http://schemas.microsoft.com/office/drawing/2014/main" id="{18469CF4-9CE8-4E74-B631-FD91591B424C}"/>
+                <a16:creationId xmlns:a16="http://schemas.microsoft.com/office/drawing/2014/main" id="{18469CF4-9CE8-4E74-B631-FD91591B424C}"/>
               </a:ext>
             </a:extLst>
           </p:cNvPr>
@@ -11792,7 +11744,7 @@
           <p:cNvPr id="2" name="Title 1">
             <a:extLst>
               <a:ext uri="{FF2B5EF4-FFF2-40B4-BE49-F238E27FC236}">
-                <a16:creationId xmlns="" xmlns:a16="http://schemas.microsoft.com/office/drawing/2014/main" id="{02A3D640-0FD3-484D-B8E5-EB588DF60022}"/>
+                <a16:creationId xmlns:a16="http://schemas.microsoft.com/office/drawing/2014/main" id="{02A3D640-0FD3-484D-B8E5-EB588DF60022}"/>
               </a:ext>
             </a:extLst>
           </p:cNvPr>
@@ -11820,7 +11772,7 @@
           <p:cNvPr id="7" name="Content Placeholder 6" descr="See page 74 in book" title="See slide title">
             <a:extLst>
               <a:ext uri="{FF2B5EF4-FFF2-40B4-BE49-F238E27FC236}">
-                <a16:creationId xmlns="" xmlns:a16="http://schemas.microsoft.com/office/drawing/2014/main" id="{3CBC125C-F7E5-4244-8AFD-F3827615E054}"/>
+                <a16:creationId xmlns:a16="http://schemas.microsoft.com/office/drawing/2014/main" id="{3CBC125C-F7E5-4244-8AFD-F3827615E054}"/>
               </a:ext>
             </a:extLst>
           </p:cNvPr>
@@ -11858,7 +11810,7 @@
           <p:cNvPr id="4" name="Date Placeholder 3">
             <a:extLst>
               <a:ext uri="{FF2B5EF4-FFF2-40B4-BE49-F238E27FC236}">
-                <a16:creationId xmlns="" xmlns:a16="http://schemas.microsoft.com/office/drawing/2014/main" id="{E5B899B1-4ADD-4050-9A95-74B9C89835C3}"/>
+                <a16:creationId xmlns:a16="http://schemas.microsoft.com/office/drawing/2014/main" id="{E5B899B1-4ADD-4050-9A95-74B9C89835C3}"/>
               </a:ext>
             </a:extLst>
           </p:cNvPr>
@@ -11890,7 +11842,7 @@
           <p:cNvPr id="5" name="Footer Placeholder 4">
             <a:extLst>
               <a:ext uri="{FF2B5EF4-FFF2-40B4-BE49-F238E27FC236}">
-                <a16:creationId xmlns="" xmlns:a16="http://schemas.microsoft.com/office/drawing/2014/main" id="{43A7D3C6-41EA-4CBD-B557-697EB87E57F4}"/>
+                <a16:creationId xmlns:a16="http://schemas.microsoft.com/office/drawing/2014/main" id="{43A7D3C6-41EA-4CBD-B557-697EB87E57F4}"/>
               </a:ext>
             </a:extLst>
           </p:cNvPr>
@@ -11922,7 +11874,7 @@
           <p:cNvPr id="6" name="Slide Number Placeholder 5">
             <a:extLst>
               <a:ext uri="{FF2B5EF4-FFF2-40B4-BE49-F238E27FC236}">
-                <a16:creationId xmlns="" xmlns:a16="http://schemas.microsoft.com/office/drawing/2014/main" id="{0F114B05-C432-4838-BBEF-2740C92A2014}"/>
+                <a16:creationId xmlns:a16="http://schemas.microsoft.com/office/drawing/2014/main" id="{0F114B05-C432-4838-BBEF-2740C92A2014}"/>
               </a:ext>
             </a:extLst>
           </p:cNvPr>
@@ -12011,7 +11963,7 @@
           <p:cNvPr id="2" name="Title 1">
             <a:extLst>
               <a:ext uri="{FF2B5EF4-FFF2-40B4-BE49-F238E27FC236}">
-                <a16:creationId xmlns="" xmlns:a16="http://schemas.microsoft.com/office/drawing/2014/main" id="{61D981A5-8286-4F39-9916-06BEA8466FF9}"/>
+                <a16:creationId xmlns:a16="http://schemas.microsoft.com/office/drawing/2014/main" id="{61D981A5-8286-4F39-9916-06BEA8466FF9}"/>
               </a:ext>
             </a:extLst>
           </p:cNvPr>
@@ -12039,7 +11991,7 @@
           <p:cNvPr id="7" name="Content Placeholder 6" descr="See page 78 in book" title="See slide title">
             <a:extLst>
               <a:ext uri="{FF2B5EF4-FFF2-40B4-BE49-F238E27FC236}">
-                <a16:creationId xmlns="" xmlns:a16="http://schemas.microsoft.com/office/drawing/2014/main" id="{9B9369AD-B5D7-4092-8B75-00A9415A8768}"/>
+                <a16:creationId xmlns:a16="http://schemas.microsoft.com/office/drawing/2014/main" id="{9B9369AD-B5D7-4092-8B75-00A9415A8768}"/>
               </a:ext>
             </a:extLst>
           </p:cNvPr>
@@ -12077,7 +12029,7 @@
           <p:cNvPr id="4" name="Date Placeholder 3">
             <a:extLst>
               <a:ext uri="{FF2B5EF4-FFF2-40B4-BE49-F238E27FC236}">
-                <a16:creationId xmlns="" xmlns:a16="http://schemas.microsoft.com/office/drawing/2014/main" id="{37B8729B-FF67-41DB-9FB9-8FEF5B406170}"/>
+                <a16:creationId xmlns:a16="http://schemas.microsoft.com/office/drawing/2014/main" id="{37B8729B-FF67-41DB-9FB9-8FEF5B406170}"/>
               </a:ext>
             </a:extLst>
           </p:cNvPr>
@@ -12109,7 +12061,7 @@
           <p:cNvPr id="5" name="Footer Placeholder 4">
             <a:extLst>
               <a:ext uri="{FF2B5EF4-FFF2-40B4-BE49-F238E27FC236}">
-                <a16:creationId xmlns="" xmlns:a16="http://schemas.microsoft.com/office/drawing/2014/main" id="{8B7BF4A8-31A7-4945-875E-B8FB31BF5A57}"/>
+                <a16:creationId xmlns:a16="http://schemas.microsoft.com/office/drawing/2014/main" id="{8B7BF4A8-31A7-4945-875E-B8FB31BF5A57}"/>
               </a:ext>
             </a:extLst>
           </p:cNvPr>
@@ -12141,7 +12093,7 @@
           <p:cNvPr id="6" name="Slide Number Placeholder 5">
             <a:extLst>
               <a:ext uri="{FF2B5EF4-FFF2-40B4-BE49-F238E27FC236}">
-                <a16:creationId xmlns="" xmlns:a16="http://schemas.microsoft.com/office/drawing/2014/main" id="{2C593A3C-C93F-40C1-A1C3-9F258110463F}"/>
+                <a16:creationId xmlns:a16="http://schemas.microsoft.com/office/drawing/2014/main" id="{2C593A3C-C93F-40C1-A1C3-9F258110463F}"/>
               </a:ext>
             </a:extLst>
           </p:cNvPr>
@@ -12199,6 +12151,761 @@
     <p:extLst>
       <p:ext uri="{BB962C8B-B14F-4D97-AF65-F5344CB8AC3E}">
         <p14:creationId xmlns:p14="http://schemas.microsoft.com/office/powerpoint/2010/main" val="999520131"/>
+      </p:ext>
+    </p:extLst>
+  </p:cSld>
+  <p:clrMapOvr>
+    <a:masterClrMapping/>
+  </p:clrMapOvr>
+</p:sld>
+</file>
+
+<file path=ppt/slides/slide32.xml><?xml version="1.0" encoding="utf-8"?>
+<p:sld xmlns:a="http://schemas.openxmlformats.org/drawingml/2006/main" xmlns:r="http://schemas.openxmlformats.org/officeDocument/2006/relationships" xmlns:p="http://schemas.openxmlformats.org/presentationml/2006/main">
+  <p:cSld>
+    <p:spTree>
+      <p:nvGrpSpPr>
+        <p:cNvPr id="1" name=""/>
+        <p:cNvGrpSpPr/>
+        <p:nvPr/>
+      </p:nvGrpSpPr>
+      <p:grpSpPr>
+        <a:xfrm>
+          <a:off x="0" y="0"/>
+          <a:ext cx="0" cy="0"/>
+          <a:chOff x="0" y="0"/>
+          <a:chExt cx="0" cy="0"/>
+        </a:xfrm>
+      </p:grpSpPr>
+      <p:sp>
+        <p:nvSpPr>
+          <p:cNvPr id="2" name="Title 1">
+            <a:extLst>
+              <a:ext uri="{FF2B5EF4-FFF2-40B4-BE49-F238E27FC236}">
+                <a16:creationId xmlns:a16="http://schemas.microsoft.com/office/drawing/2014/main" id="{92A211AE-B547-4D98-98A9-47E8254E19D3}"/>
+              </a:ext>
+            </a:extLst>
+          </p:cNvPr>
+          <p:cNvSpPr>
+            <a:spLocks noGrp="1"/>
+          </p:cNvSpPr>
+          <p:nvPr>
+            <p:ph type="title"/>
+          </p:nvPr>
+        </p:nvSpPr>
+        <p:spPr/>
+        <p:txBody>
+          <a:bodyPr/>
+          <a:lstStyle/>
+          <a:p>
+            <a:pPr marL="0" marR="0">
+              <a:spcBef>
+                <a:spcPts val="0"/>
+              </a:spcBef>
+              <a:spcAft>
+                <a:spcPts val="600"/>
+              </a:spcAft>
+              <a:tabLst>
+                <a:tab pos="1371600" algn="l"/>
+              </a:tabLst>
+            </a:pPr>
+            <a:r>
+              <a:rPr lang="en-US" dirty="0">
+                <a:latin typeface="Arial" panose="020B0604020202020204" pitchFamily="34" charset="0"/>
+                <a:ea typeface="Times New Roman" panose="02020603050405020304" pitchFamily="18" charset="0"/>
+                <a:cs typeface="Times New Roman" panose="02020603050405020304" pitchFamily="18" charset="0"/>
+              </a:rPr>
+              <a:t>Objectives</a:t>
+            </a:r>
+            <a:endParaRPr lang="en-US" dirty="0"/>
+          </a:p>
+        </p:txBody>
+      </p:sp>
+      <p:sp>
+        <p:nvSpPr>
+          <p:cNvPr id="3" name="Text Placeholder 2">
+            <a:extLst>
+              <a:ext uri="{FF2B5EF4-FFF2-40B4-BE49-F238E27FC236}">
+                <a16:creationId xmlns:a16="http://schemas.microsoft.com/office/drawing/2014/main" id="{14E7CCBF-8298-4288-BB50-7D22994B1B21}"/>
+              </a:ext>
+            </a:extLst>
+          </p:cNvPr>
+          <p:cNvSpPr>
+            <a:spLocks noGrp="1"/>
+          </p:cNvSpPr>
+          <p:nvPr>
+            <p:ph type="body" sz="quarter" idx="13"/>
+          </p:nvPr>
+        </p:nvSpPr>
+        <p:spPr>
+          <a:xfrm>
+            <a:off x="838200" y="1066800"/>
+            <a:ext cx="7543800" cy="4876800"/>
+          </a:xfrm>
+        </p:spPr>
+        <p:txBody>
+          <a:bodyPr/>
+          <a:lstStyle/>
+          <a:p>
+            <a:pPr>
+              <a:spcBef>
+                <a:spcPts val="1500"/>
+              </a:spcBef>
+              <a:spcAft>
+                <a:spcPts val="600"/>
+              </a:spcAft>
+              <a:tabLst>
+                <a:tab pos="1371600" algn="l"/>
+              </a:tabLst>
+            </a:pPr>
+            <a:r>
+              <a:rPr lang="en-US" b="1" dirty="0">
+                <a:latin typeface="Arial" panose="020B0604020202020204" pitchFamily="34" charset="0"/>
+                <a:ea typeface="Times New Roman" panose="02020603050405020304" pitchFamily="18" charset="0"/>
+                <a:cs typeface="Times New Roman" panose="02020603050405020304" pitchFamily="18" charset="0"/>
+              </a:rPr>
+              <a:t>Applied</a:t>
+            </a:r>
+          </a:p>
+          <a:p>
+            <a:pPr marL="342900" marR="274320" lvl="0" indent="-342900">
+              <a:spcBef>
+                <a:spcPts val="0"/>
+              </a:spcBef>
+              <a:spcAft>
+                <a:spcPts val="600"/>
+              </a:spcAft>
+              <a:buFont typeface="+mj-lt"/>
+              <a:buAutoNum type="arabicPeriod"/>
+              <a:tabLst>
+                <a:tab pos="365760" algn="l"/>
+              </a:tabLst>
+            </a:pPr>
+            <a:r>
+              <a:rPr lang="en-US" spc="-10" dirty="0">
+                <a:latin typeface="Times New Roman" panose="02020603050405020304" pitchFamily="18" charset="0"/>
+                <a:ea typeface="Times New Roman" panose="02020603050405020304" pitchFamily="18" charset="0"/>
+              </a:rPr>
+              <a:t>Use a text editor like Brackets to create and edit HTML and CSS files.</a:t>
+            </a:r>
+          </a:p>
+          <a:p>
+            <a:pPr marL="342900" marR="274320" lvl="0" indent="-342900">
+              <a:spcBef>
+                <a:spcPts val="0"/>
+              </a:spcBef>
+              <a:spcAft>
+                <a:spcPts val="600"/>
+              </a:spcAft>
+              <a:buFont typeface="+mj-lt"/>
+              <a:buAutoNum type="arabicPeriod"/>
+              <a:tabLst>
+                <a:tab pos="365760" algn="l"/>
+              </a:tabLst>
+            </a:pPr>
+            <a:r>
+              <a:rPr lang="en-US" spc="-10" dirty="0">
+                <a:latin typeface="Times New Roman" panose="02020603050405020304" pitchFamily="18" charset="0"/>
+                <a:ea typeface="Times New Roman" panose="02020603050405020304" pitchFamily="18" charset="0"/>
+              </a:rPr>
+              <a:t>Test an HTML document that’s stored on your computer or a local server by loading it into a browser.</a:t>
+            </a:r>
+          </a:p>
+          <a:p>
+            <a:pPr marL="342900" marR="274320" lvl="0" indent="-342900">
+              <a:spcBef>
+                <a:spcPts val="0"/>
+              </a:spcBef>
+              <a:spcAft>
+                <a:spcPts val="600"/>
+              </a:spcAft>
+              <a:buFont typeface="+mj-lt"/>
+              <a:buAutoNum type="arabicPeriod"/>
+              <a:tabLst>
+                <a:tab pos="365760" algn="l"/>
+              </a:tabLst>
+            </a:pPr>
+            <a:r>
+              <a:rPr lang="en-US" spc="-10" dirty="0">
+                <a:latin typeface="Times New Roman" panose="02020603050405020304" pitchFamily="18" charset="0"/>
+                <a:ea typeface="Times New Roman" panose="02020603050405020304" pitchFamily="18" charset="0"/>
+              </a:rPr>
+              <a:t>Validate an HTML document using a website like W3C Markup Validation Service.</a:t>
+            </a:r>
+          </a:p>
+          <a:p>
+            <a:pPr>
+              <a:spcBef>
+                <a:spcPts val="1500"/>
+              </a:spcBef>
+              <a:spcAft>
+                <a:spcPts val="600"/>
+              </a:spcAft>
+              <a:tabLst>
+                <a:tab pos="1371600" algn="l"/>
+              </a:tabLst>
+            </a:pPr>
+            <a:r>
+              <a:rPr lang="en-US" b="1" dirty="0">
+                <a:latin typeface="Arial" panose="020B0604020202020204" pitchFamily="34" charset="0"/>
+                <a:ea typeface="Times New Roman" panose="02020603050405020304" pitchFamily="18" charset="0"/>
+                <a:cs typeface="Times New Roman" panose="02020603050405020304" pitchFamily="18" charset="0"/>
+              </a:rPr>
+              <a:t>Knowledge</a:t>
+            </a:r>
+          </a:p>
+          <a:p>
+            <a:pPr marL="342900" marR="274320" lvl="0" indent="-342900">
+              <a:spcBef>
+                <a:spcPts val="0"/>
+              </a:spcBef>
+              <a:spcAft>
+                <a:spcPts val="600"/>
+              </a:spcAft>
+              <a:buFont typeface="+mj-lt"/>
+              <a:buAutoNum type="arabicPeriod"/>
+              <a:tabLst>
+                <a:tab pos="365760" algn="l"/>
+              </a:tabLst>
+            </a:pPr>
+            <a:r>
+              <a:rPr lang="en-US" spc="-10" dirty="0">
+                <a:latin typeface="Times New Roman" panose="02020603050405020304" pitchFamily="18" charset="0"/>
+                <a:ea typeface="Times New Roman" panose="02020603050405020304" pitchFamily="18" charset="0"/>
+              </a:rPr>
+              <a:t>Describe the use of the head and body elements in an HTML document.</a:t>
+            </a:r>
+          </a:p>
+          <a:p>
+            <a:pPr marL="342900" marR="274320" lvl="0" indent="-342900">
+              <a:spcBef>
+                <a:spcPts val="0"/>
+              </a:spcBef>
+              <a:spcAft>
+                <a:spcPts val="600"/>
+              </a:spcAft>
+              <a:buFont typeface="+mj-lt"/>
+              <a:buAutoNum type="arabicPeriod"/>
+              <a:tabLst>
+                <a:tab pos="365760" algn="l"/>
+              </a:tabLst>
+            </a:pPr>
+            <a:r>
+              <a:rPr lang="en-US" spc="-10" dirty="0">
+                <a:latin typeface="Times New Roman" panose="02020603050405020304" pitchFamily="18" charset="0"/>
+                <a:ea typeface="Times New Roman" panose="02020603050405020304" pitchFamily="18" charset="0"/>
+              </a:rPr>
+              <a:t>Describe these types of HTML tags: opening, closing, and empty.</a:t>
+            </a:r>
+          </a:p>
+          <a:p>
+            <a:pPr marL="342900" marR="274320" lvl="0" indent="-342900">
+              <a:spcBef>
+                <a:spcPts val="0"/>
+              </a:spcBef>
+              <a:spcAft>
+                <a:spcPts val="600"/>
+              </a:spcAft>
+              <a:buFont typeface="+mj-lt"/>
+              <a:buAutoNum type="arabicPeriod"/>
+              <a:tabLst>
+                <a:tab pos="365760" algn="l"/>
+              </a:tabLst>
+            </a:pPr>
+            <a:r>
+              <a:rPr lang="en-US" spc="-10" dirty="0">
+                <a:latin typeface="Times New Roman" panose="02020603050405020304" pitchFamily="18" charset="0"/>
+                <a:ea typeface="Times New Roman" panose="02020603050405020304" pitchFamily="18" charset="0"/>
+              </a:rPr>
+              <a:t>Describe the use of attributes within HTML tags.</a:t>
+            </a:r>
+          </a:p>
+          <a:p>
+            <a:pPr marL="342900" marR="274320" lvl="0" indent="-342900">
+              <a:spcBef>
+                <a:spcPts val="0"/>
+              </a:spcBef>
+              <a:spcAft>
+                <a:spcPts val="600"/>
+              </a:spcAft>
+              <a:buFont typeface="+mj-lt"/>
+              <a:buAutoNum type="arabicPeriod"/>
+              <a:tabLst>
+                <a:tab pos="365760" algn="l"/>
+              </a:tabLst>
+            </a:pPr>
+            <a:r>
+              <a:rPr lang="en-US" spc="-10" dirty="0">
+                <a:latin typeface="Times New Roman" panose="02020603050405020304" pitchFamily="18" charset="0"/>
+                <a:ea typeface="Times New Roman" panose="02020603050405020304" pitchFamily="18" charset="0"/>
+              </a:rPr>
+              <a:t>Describe the use of HTML comments and whitespace.</a:t>
+            </a:r>
+          </a:p>
+          <a:p>
+            <a:endParaRPr lang="en-US" dirty="0"/>
+          </a:p>
+        </p:txBody>
+      </p:sp>
+      <p:sp>
+        <p:nvSpPr>
+          <p:cNvPr id="4" name="Date Placeholder 3">
+            <a:extLst>
+              <a:ext uri="{FF2B5EF4-FFF2-40B4-BE49-F238E27FC236}">
+                <a16:creationId xmlns:a16="http://schemas.microsoft.com/office/drawing/2014/main" id="{8CB08FB3-CB63-457A-8F81-8AEBAB8F5177}"/>
+              </a:ext>
+            </a:extLst>
+          </p:cNvPr>
+          <p:cNvSpPr>
+            <a:spLocks noGrp="1"/>
+          </p:cNvSpPr>
+          <p:nvPr>
+            <p:ph type="dt" sz="half" idx="14"/>
+          </p:nvPr>
+        </p:nvSpPr>
+        <p:spPr/>
+        <p:txBody>
+          <a:bodyPr/>
+          <a:lstStyle/>
+          <a:p>
+            <a:pPr>
+              <a:defRPr/>
+            </a:pPr>
+            <a:r>
+              <a:rPr lang="en-US"/>
+              <a:t>Murach's HTML and CSS, 4th Edition</a:t>
+            </a:r>
+            <a:endParaRPr lang="en-US" dirty="0"/>
+          </a:p>
+        </p:txBody>
+      </p:sp>
+      <p:sp>
+        <p:nvSpPr>
+          <p:cNvPr id="5" name="Footer Placeholder 4">
+            <a:extLst>
+              <a:ext uri="{FF2B5EF4-FFF2-40B4-BE49-F238E27FC236}">
+                <a16:creationId xmlns:a16="http://schemas.microsoft.com/office/drawing/2014/main" id="{3B69616A-0268-4C55-8B72-B75B738B9095}"/>
+              </a:ext>
+            </a:extLst>
+          </p:cNvPr>
+          <p:cNvSpPr>
+            <a:spLocks noGrp="1"/>
+          </p:cNvSpPr>
+          <p:nvPr>
+            <p:ph type="ftr" sz="quarter" idx="15"/>
+          </p:nvPr>
+        </p:nvSpPr>
+        <p:spPr/>
+        <p:txBody>
+          <a:bodyPr/>
+          <a:lstStyle/>
+          <a:p>
+            <a:pPr>
+              <a:defRPr/>
+            </a:pPr>
+            <a:r>
+              <a:rPr lang="en-US"/>
+              <a:t>© 2018, Mike Murach &amp; Associates, Inc.</a:t>
+            </a:r>
+            <a:endParaRPr lang="en-US" dirty="0"/>
+          </a:p>
+        </p:txBody>
+      </p:sp>
+      <p:sp>
+        <p:nvSpPr>
+          <p:cNvPr id="6" name="Slide Number Placeholder 5">
+            <a:extLst>
+              <a:ext uri="{FF2B5EF4-FFF2-40B4-BE49-F238E27FC236}">
+                <a16:creationId xmlns:a16="http://schemas.microsoft.com/office/drawing/2014/main" id="{DC3558FE-610C-405D-9BF6-2FC0D38694D6}"/>
+              </a:ext>
+            </a:extLst>
+          </p:cNvPr>
+          <p:cNvSpPr>
+            <a:spLocks noGrp="1"/>
+          </p:cNvSpPr>
+          <p:nvPr>
+            <p:ph type="sldNum" sz="quarter" idx="16"/>
+          </p:nvPr>
+        </p:nvSpPr>
+        <p:spPr/>
+        <p:txBody>
+          <a:bodyPr/>
+          <a:lstStyle/>
+          <a:p>
+            <a:pPr algn="l">
+              <a:defRPr/>
+            </a:pPr>
+            <a:endParaRPr lang="en-US" sz="1400" dirty="0">
+              <a:latin typeface="Times New Roman"/>
+            </a:endParaRPr>
+          </a:p>
+          <a:p>
+            <a:pPr>
+              <a:defRPr/>
+            </a:pPr>
+            <a:r>
+              <a:rPr lang="en-US" dirty="0">
+                <a:solidFill>
+                  <a:schemeClr val="bg1"/>
+                </a:solidFill>
+              </a:rPr>
+              <a:t>C2, Slide </a:t>
+            </a:r>
+            <a:fld id="{BF5C1183-B085-4070-A402-C03A3F977D3D}" type="slidenum">
+              <a:rPr lang="en-US" smtClean="0">
+                <a:solidFill>
+                  <a:schemeClr val="bg1"/>
+                </a:solidFill>
+              </a:rPr>
+              <a:pPr>
+                <a:defRPr/>
+              </a:pPr>
+              <a:t>32</a:t>
+            </a:fld>
+            <a:endParaRPr lang="en-US" dirty="0">
+              <a:solidFill>
+                <a:schemeClr val="bg1"/>
+              </a:solidFill>
+            </a:endParaRPr>
+          </a:p>
+        </p:txBody>
+      </p:sp>
+    </p:spTree>
+    <p:extLst>
+      <p:ext uri="{BB962C8B-B14F-4D97-AF65-F5344CB8AC3E}">
+        <p14:creationId xmlns:p14="http://schemas.microsoft.com/office/powerpoint/2010/main" val="2787867319"/>
+      </p:ext>
+    </p:extLst>
+  </p:cSld>
+  <p:clrMapOvr>
+    <a:masterClrMapping/>
+  </p:clrMapOvr>
+</p:sld>
+</file>
+
+<file path=ppt/slides/slide33.xml><?xml version="1.0" encoding="utf-8"?>
+<p:sld xmlns:a="http://schemas.openxmlformats.org/drawingml/2006/main" xmlns:r="http://schemas.openxmlformats.org/officeDocument/2006/relationships" xmlns:p="http://schemas.openxmlformats.org/presentationml/2006/main">
+  <p:cSld>
+    <p:spTree>
+      <p:nvGrpSpPr>
+        <p:cNvPr id="1" name=""/>
+        <p:cNvGrpSpPr/>
+        <p:nvPr/>
+      </p:nvGrpSpPr>
+      <p:grpSpPr>
+        <a:xfrm>
+          <a:off x="0" y="0"/>
+          <a:ext cx="0" cy="0"/>
+          <a:chOff x="0" y="0"/>
+          <a:chExt cx="0" cy="0"/>
+        </a:xfrm>
+      </p:grpSpPr>
+      <p:sp>
+        <p:nvSpPr>
+          <p:cNvPr id="2" name="Title 1">
+            <a:extLst>
+              <a:ext uri="{FF2B5EF4-FFF2-40B4-BE49-F238E27FC236}">
+                <a16:creationId xmlns:a16="http://schemas.microsoft.com/office/drawing/2014/main" id="{E8BE66FE-4D88-4B9E-AB32-F682FF72D268}"/>
+              </a:ext>
+            </a:extLst>
+          </p:cNvPr>
+          <p:cNvSpPr>
+            <a:spLocks noGrp="1"/>
+          </p:cNvSpPr>
+          <p:nvPr>
+            <p:ph type="title"/>
+          </p:nvPr>
+        </p:nvSpPr>
+        <p:spPr/>
+        <p:txBody>
+          <a:bodyPr/>
+          <a:lstStyle/>
+          <a:p>
+            <a:pPr marL="0" marR="0">
+              <a:spcBef>
+                <a:spcPts val="0"/>
+              </a:spcBef>
+              <a:spcAft>
+                <a:spcPts val="600"/>
+              </a:spcAft>
+              <a:tabLst>
+                <a:tab pos="1371600" algn="l"/>
+              </a:tabLst>
+            </a:pPr>
+            <a:r>
+              <a:rPr lang="en-US" dirty="0">
+                <a:latin typeface="Arial" panose="020B0604020202020204" pitchFamily="34" charset="0"/>
+                <a:ea typeface="Times New Roman" panose="02020603050405020304" pitchFamily="18" charset="0"/>
+                <a:cs typeface="Times New Roman" panose="02020603050405020304" pitchFamily="18" charset="0"/>
+              </a:rPr>
+              <a:t>Objectives (continued)</a:t>
+            </a:r>
+            <a:endParaRPr lang="en-US" dirty="0"/>
+          </a:p>
+        </p:txBody>
+      </p:sp>
+      <p:sp>
+        <p:nvSpPr>
+          <p:cNvPr id="3" name="Text Placeholder 2">
+            <a:extLst>
+              <a:ext uri="{FF2B5EF4-FFF2-40B4-BE49-F238E27FC236}">
+                <a16:creationId xmlns:a16="http://schemas.microsoft.com/office/drawing/2014/main" id="{9BB2C6AC-2DF3-4E61-A737-A14C18EEDF6D}"/>
+              </a:ext>
+            </a:extLst>
+          </p:cNvPr>
+          <p:cNvSpPr>
+            <a:spLocks noGrp="1"/>
+          </p:cNvSpPr>
+          <p:nvPr>
+            <p:ph type="body" sz="quarter" idx="13"/>
+          </p:nvPr>
+        </p:nvSpPr>
+        <p:spPr/>
+        <p:txBody>
+          <a:bodyPr/>
+          <a:lstStyle/>
+          <a:p>
+            <a:pPr marL="457200" marR="274320" lvl="0" indent="-457200">
+              <a:spcBef>
+                <a:spcPts val="0"/>
+              </a:spcBef>
+              <a:spcAft>
+                <a:spcPts val="600"/>
+              </a:spcAft>
+              <a:buFont typeface="+mj-lt"/>
+              <a:buAutoNum type="arabicPeriod" startAt="5"/>
+              <a:tabLst>
+                <a:tab pos="365760" algn="l"/>
+              </a:tabLst>
+            </a:pPr>
+            <a:r>
+              <a:rPr lang="en-US" spc="-10" dirty="0">
+                <a:latin typeface="Times New Roman" panose="02020603050405020304" pitchFamily="18" charset="0"/>
+                <a:ea typeface="Times New Roman" panose="02020603050405020304" pitchFamily="18" charset="0"/>
+              </a:rPr>
+              <a:t>Describe the components of a CSS style rule.</a:t>
+            </a:r>
+          </a:p>
+          <a:p>
+            <a:pPr marL="457200" marR="274320" lvl="0" indent="-457200">
+              <a:spcBef>
+                <a:spcPts val="0"/>
+              </a:spcBef>
+              <a:spcAft>
+                <a:spcPts val="600"/>
+              </a:spcAft>
+              <a:buFont typeface="+mj-lt"/>
+              <a:buAutoNum type="arabicPeriod" startAt="5"/>
+              <a:tabLst>
+                <a:tab pos="365760" algn="l"/>
+              </a:tabLst>
+            </a:pPr>
+            <a:r>
+              <a:rPr lang="en-US" spc="-10" dirty="0">
+                <a:latin typeface="Times New Roman" panose="02020603050405020304" pitchFamily="18" charset="0"/>
+                <a:ea typeface="Times New Roman" panose="02020603050405020304" pitchFamily="18" charset="0"/>
+              </a:rPr>
+              <a:t>Describe the use of these types of CSS selectors: type, id, and class.</a:t>
+            </a:r>
+          </a:p>
+          <a:p>
+            <a:pPr marL="457200" marR="274320" lvl="0" indent="-457200">
+              <a:spcBef>
+                <a:spcPts val="0"/>
+              </a:spcBef>
+              <a:spcAft>
+                <a:spcPts val="600"/>
+              </a:spcAft>
+              <a:buFont typeface="+mj-lt"/>
+              <a:buAutoNum type="arabicPeriod" startAt="5"/>
+              <a:tabLst>
+                <a:tab pos="365760" algn="l"/>
+              </a:tabLst>
+            </a:pPr>
+            <a:r>
+              <a:rPr lang="en-US" spc="-10" dirty="0">
+                <a:latin typeface="Times New Roman" panose="02020603050405020304" pitchFamily="18" charset="0"/>
+                <a:ea typeface="Times New Roman" panose="02020603050405020304" pitchFamily="18" charset="0"/>
+              </a:rPr>
+              <a:t>Explain how and why you would start a new HTML or CSS file from a template.</a:t>
+            </a:r>
+          </a:p>
+          <a:p>
+            <a:pPr marL="457200" marR="274320" lvl="0" indent="-457200">
+              <a:spcBef>
+                <a:spcPts val="0"/>
+              </a:spcBef>
+              <a:spcAft>
+                <a:spcPts val="600"/>
+              </a:spcAft>
+              <a:buFont typeface="+mj-lt"/>
+              <a:buAutoNum type="arabicPeriod" startAt="5"/>
+              <a:tabLst>
+                <a:tab pos="365760" algn="l"/>
+              </a:tabLst>
+            </a:pPr>
+            <a:r>
+              <a:rPr lang="en-US" spc="-10" dirty="0">
+                <a:latin typeface="Times New Roman" panose="02020603050405020304" pitchFamily="18" charset="0"/>
+                <a:ea typeface="Times New Roman" panose="02020603050405020304" pitchFamily="18" charset="0"/>
+              </a:rPr>
+              <a:t>Describe three ways to run a web page and one way to retest a page after you’ve changed the source code for the page.</a:t>
+            </a:r>
+          </a:p>
+          <a:p>
+            <a:pPr marL="457200" marR="274320" lvl="0" indent="-457200">
+              <a:spcBef>
+                <a:spcPts val="0"/>
+              </a:spcBef>
+              <a:spcAft>
+                <a:spcPts val="600"/>
+              </a:spcAft>
+              <a:buFont typeface="+mj-lt"/>
+              <a:buAutoNum type="arabicPeriod" startAt="5"/>
+              <a:tabLst>
+                <a:tab pos="365760" algn="l"/>
+              </a:tabLst>
+            </a:pPr>
+            <a:r>
+              <a:rPr lang="en-US" spc="-10" dirty="0">
+                <a:latin typeface="Times New Roman" panose="02020603050405020304" pitchFamily="18" charset="0"/>
+                <a:ea typeface="Times New Roman" panose="02020603050405020304" pitchFamily="18" charset="0"/>
+              </a:rPr>
+              <a:t>Describe two benefits of validating HTML files.</a:t>
+            </a:r>
+          </a:p>
+          <a:p>
+            <a:endParaRPr lang="en-US" dirty="0"/>
+          </a:p>
+        </p:txBody>
+      </p:sp>
+      <p:sp>
+        <p:nvSpPr>
+          <p:cNvPr id="4" name="Date Placeholder 3">
+            <a:extLst>
+              <a:ext uri="{FF2B5EF4-FFF2-40B4-BE49-F238E27FC236}">
+                <a16:creationId xmlns:a16="http://schemas.microsoft.com/office/drawing/2014/main" id="{1902CD47-C3B4-4CBA-96BA-8AC40ED59DD6}"/>
+              </a:ext>
+            </a:extLst>
+          </p:cNvPr>
+          <p:cNvSpPr>
+            <a:spLocks noGrp="1"/>
+          </p:cNvSpPr>
+          <p:nvPr>
+            <p:ph type="dt" sz="half" idx="14"/>
+          </p:nvPr>
+        </p:nvSpPr>
+        <p:spPr/>
+        <p:txBody>
+          <a:bodyPr/>
+          <a:lstStyle/>
+          <a:p>
+            <a:pPr>
+              <a:defRPr/>
+            </a:pPr>
+            <a:r>
+              <a:rPr lang="en-US"/>
+              <a:t>Murach's HTML and CSS, 4th Edition</a:t>
+            </a:r>
+            <a:endParaRPr lang="en-US" dirty="0"/>
+          </a:p>
+        </p:txBody>
+      </p:sp>
+      <p:sp>
+        <p:nvSpPr>
+          <p:cNvPr id="5" name="Footer Placeholder 4">
+            <a:extLst>
+              <a:ext uri="{FF2B5EF4-FFF2-40B4-BE49-F238E27FC236}">
+                <a16:creationId xmlns:a16="http://schemas.microsoft.com/office/drawing/2014/main" id="{04907F47-D86D-4F45-8217-8AA9D2764F7E}"/>
+              </a:ext>
+            </a:extLst>
+          </p:cNvPr>
+          <p:cNvSpPr>
+            <a:spLocks noGrp="1"/>
+          </p:cNvSpPr>
+          <p:nvPr>
+            <p:ph type="ftr" sz="quarter" idx="15"/>
+          </p:nvPr>
+        </p:nvSpPr>
+        <p:spPr/>
+        <p:txBody>
+          <a:bodyPr/>
+          <a:lstStyle/>
+          <a:p>
+            <a:pPr>
+              <a:defRPr/>
+            </a:pPr>
+            <a:r>
+              <a:rPr lang="en-US"/>
+              <a:t>© 2018, Mike Murach &amp; Associates, Inc.</a:t>
+            </a:r>
+            <a:endParaRPr lang="en-US" dirty="0"/>
+          </a:p>
+        </p:txBody>
+      </p:sp>
+      <p:sp>
+        <p:nvSpPr>
+          <p:cNvPr id="6" name="Slide Number Placeholder 5">
+            <a:extLst>
+              <a:ext uri="{FF2B5EF4-FFF2-40B4-BE49-F238E27FC236}">
+                <a16:creationId xmlns:a16="http://schemas.microsoft.com/office/drawing/2014/main" id="{18469CF4-9CE8-4E74-B631-FD91591B424C}"/>
+              </a:ext>
+            </a:extLst>
+          </p:cNvPr>
+          <p:cNvSpPr>
+            <a:spLocks noGrp="1"/>
+          </p:cNvSpPr>
+          <p:nvPr>
+            <p:ph type="sldNum" sz="quarter" idx="16"/>
+          </p:nvPr>
+        </p:nvSpPr>
+        <p:spPr/>
+        <p:txBody>
+          <a:bodyPr/>
+          <a:lstStyle/>
+          <a:p>
+            <a:pPr algn="l">
+              <a:defRPr/>
+            </a:pPr>
+            <a:endParaRPr lang="en-US" sz="1400" dirty="0">
+              <a:latin typeface="Times New Roman"/>
+            </a:endParaRPr>
+          </a:p>
+          <a:p>
+            <a:pPr>
+              <a:defRPr/>
+            </a:pPr>
+            <a:r>
+              <a:rPr lang="en-US" dirty="0">
+                <a:solidFill>
+                  <a:schemeClr val="bg1"/>
+                </a:solidFill>
+              </a:rPr>
+              <a:t>C2, Slide </a:t>
+            </a:r>
+            <a:fld id="{BF5C1183-B085-4070-A402-C03A3F977D3D}" type="slidenum">
+              <a:rPr lang="en-US" smtClean="0">
+                <a:solidFill>
+                  <a:schemeClr val="bg1"/>
+                </a:solidFill>
+              </a:rPr>
+              <a:pPr>
+                <a:defRPr/>
+              </a:pPr>
+              <a:t>33</a:t>
+            </a:fld>
+            <a:endParaRPr lang="en-US" dirty="0">
+              <a:solidFill>
+                <a:schemeClr val="bg1"/>
+              </a:solidFill>
+            </a:endParaRPr>
+          </a:p>
+        </p:txBody>
+      </p:sp>
+    </p:spTree>
+    <p:extLst>
+      <p:ext uri="{BB962C8B-B14F-4D97-AF65-F5344CB8AC3E}">
+        <p14:creationId xmlns:p14="http://schemas.microsoft.com/office/powerpoint/2010/main" val="4054736581"/>
       </p:ext>
     </p:extLst>
   </p:cSld>
@@ -12230,7 +12937,7 @@
           <p:cNvPr id="2" name="Title 1">
             <a:extLst>
               <a:ext uri="{FF2B5EF4-FFF2-40B4-BE49-F238E27FC236}">
-                <a16:creationId xmlns="" xmlns:a16="http://schemas.microsoft.com/office/drawing/2014/main" id="{731BE993-8CA6-48C0-858E-4C989226D01C}"/>
+                <a16:creationId xmlns:a16="http://schemas.microsoft.com/office/drawing/2014/main" id="{731BE993-8CA6-48C0-858E-4C989226D01C}"/>
               </a:ext>
             </a:extLst>
           </p:cNvPr>
@@ -12274,7 +12981,7 @@
           <p:cNvPr id="8" name="Content Placeholder 7" descr="See page 46 in book" title="See slide title">
             <a:extLst>
               <a:ext uri="{FF2B5EF4-FFF2-40B4-BE49-F238E27FC236}">
-                <a16:creationId xmlns="" xmlns:a16="http://schemas.microsoft.com/office/drawing/2014/main" id="{13E51628-98B4-4BDD-81FC-A3B9CF232FBD}"/>
+                <a16:creationId xmlns:a16="http://schemas.microsoft.com/office/drawing/2014/main" id="{13E51628-98B4-4BDD-81FC-A3B9CF232FBD}"/>
               </a:ext>
             </a:extLst>
           </p:cNvPr>
@@ -12309,7 +13016,7 @@
           <p:cNvPr id="4" name="Date Placeholder 3">
             <a:extLst>
               <a:ext uri="{FF2B5EF4-FFF2-40B4-BE49-F238E27FC236}">
-                <a16:creationId xmlns="" xmlns:a16="http://schemas.microsoft.com/office/drawing/2014/main" id="{4CAD08F6-8961-418F-9C2D-84A8440CC711}"/>
+                <a16:creationId xmlns:a16="http://schemas.microsoft.com/office/drawing/2014/main" id="{4CAD08F6-8961-418F-9C2D-84A8440CC711}"/>
               </a:ext>
             </a:extLst>
           </p:cNvPr>
@@ -12341,7 +13048,7 @@
           <p:cNvPr id="5" name="Footer Placeholder 4">
             <a:extLst>
               <a:ext uri="{FF2B5EF4-FFF2-40B4-BE49-F238E27FC236}">
-                <a16:creationId xmlns="" xmlns:a16="http://schemas.microsoft.com/office/drawing/2014/main" id="{791E54AD-8D2E-4011-B9BC-91A7BC45EA84}"/>
+                <a16:creationId xmlns:a16="http://schemas.microsoft.com/office/drawing/2014/main" id="{791E54AD-8D2E-4011-B9BC-91A7BC45EA84}"/>
               </a:ext>
             </a:extLst>
           </p:cNvPr>
@@ -12373,7 +13080,7 @@
           <p:cNvPr id="6" name="Slide Number Placeholder 5">
             <a:extLst>
               <a:ext uri="{FF2B5EF4-FFF2-40B4-BE49-F238E27FC236}">
-                <a16:creationId xmlns="" xmlns:a16="http://schemas.microsoft.com/office/drawing/2014/main" id="{03CA9D59-8A7A-4892-A23D-247C267BD8D1}"/>
+                <a16:creationId xmlns:a16="http://schemas.microsoft.com/office/drawing/2014/main" id="{03CA9D59-8A7A-4892-A23D-247C267BD8D1}"/>
               </a:ext>
             </a:extLst>
           </p:cNvPr>
@@ -12462,7 +13169,7 @@
           <p:cNvPr id="2" name="Title 1">
             <a:extLst>
               <a:ext uri="{FF2B5EF4-FFF2-40B4-BE49-F238E27FC236}">
-                <a16:creationId xmlns="" xmlns:a16="http://schemas.microsoft.com/office/drawing/2014/main" id="{F30E793A-9358-4A92-9A87-9113706A63ED}"/>
+                <a16:creationId xmlns:a16="http://schemas.microsoft.com/office/drawing/2014/main" id="{F30E793A-9358-4A92-9A87-9113706A63ED}"/>
               </a:ext>
             </a:extLst>
           </p:cNvPr>
@@ -12506,7 +13213,7 @@
           <p:cNvPr id="3" name="Text Placeholder 2">
             <a:extLst>
               <a:ext uri="{FF2B5EF4-FFF2-40B4-BE49-F238E27FC236}">
-                <a16:creationId xmlns="" xmlns:a16="http://schemas.microsoft.com/office/drawing/2014/main" id="{4DFCE31F-875F-4E94-92BC-D9D3FA8600D8}"/>
+                <a16:creationId xmlns:a16="http://schemas.microsoft.com/office/drawing/2014/main" id="{4DFCE31F-875F-4E94-92BC-D9D3FA8600D8}"/>
               </a:ext>
             </a:extLst>
           </p:cNvPr>
@@ -12894,7 +13601,7 @@
           <p:cNvPr id="4" name="Date Placeholder 3">
             <a:extLst>
               <a:ext uri="{FF2B5EF4-FFF2-40B4-BE49-F238E27FC236}">
-                <a16:creationId xmlns="" xmlns:a16="http://schemas.microsoft.com/office/drawing/2014/main" id="{5D4F2B1C-7189-4203-843A-B75B4B1189BE}"/>
+                <a16:creationId xmlns:a16="http://schemas.microsoft.com/office/drawing/2014/main" id="{5D4F2B1C-7189-4203-843A-B75B4B1189BE}"/>
               </a:ext>
             </a:extLst>
           </p:cNvPr>
@@ -12926,7 +13633,7 @@
           <p:cNvPr id="5" name="Footer Placeholder 4">
             <a:extLst>
               <a:ext uri="{FF2B5EF4-FFF2-40B4-BE49-F238E27FC236}">
-                <a16:creationId xmlns="" xmlns:a16="http://schemas.microsoft.com/office/drawing/2014/main" id="{A500D164-F3A2-480C-967A-90FF2FB335E2}"/>
+                <a16:creationId xmlns:a16="http://schemas.microsoft.com/office/drawing/2014/main" id="{A500D164-F3A2-480C-967A-90FF2FB335E2}"/>
               </a:ext>
             </a:extLst>
           </p:cNvPr>
@@ -12958,7 +13665,7 @@
           <p:cNvPr id="6" name="Slide Number Placeholder 5">
             <a:extLst>
               <a:ext uri="{FF2B5EF4-FFF2-40B4-BE49-F238E27FC236}">
-                <a16:creationId xmlns="" xmlns:a16="http://schemas.microsoft.com/office/drawing/2014/main" id="{45BFDC19-0E51-4F13-9A67-E44AC8A32974}"/>
+                <a16:creationId xmlns:a16="http://schemas.microsoft.com/office/drawing/2014/main" id="{45BFDC19-0E51-4F13-9A67-E44AC8A32974}"/>
               </a:ext>
             </a:extLst>
           </p:cNvPr>
@@ -13047,7 +13754,7 @@
           <p:cNvPr id="2" name="Title 1">
             <a:extLst>
               <a:ext uri="{FF2B5EF4-FFF2-40B4-BE49-F238E27FC236}">
-                <a16:creationId xmlns="" xmlns:a16="http://schemas.microsoft.com/office/drawing/2014/main" id="{170DAF2A-0240-4D12-BBE5-DED9C275A1A3}"/>
+                <a16:creationId xmlns:a16="http://schemas.microsoft.com/office/drawing/2014/main" id="{170DAF2A-0240-4D12-BBE5-DED9C275A1A3}"/>
               </a:ext>
             </a:extLst>
           </p:cNvPr>
@@ -13091,7 +13798,7 @@
           <p:cNvPr id="3" name="Text Placeholder 2">
             <a:extLst>
               <a:ext uri="{FF2B5EF4-FFF2-40B4-BE49-F238E27FC236}">
-                <a16:creationId xmlns="" xmlns:a16="http://schemas.microsoft.com/office/drawing/2014/main" id="{5A80DE1C-1040-4CFF-89B6-07E5FFE3E2FA}"/>
+                <a16:creationId xmlns:a16="http://schemas.microsoft.com/office/drawing/2014/main" id="{5A80DE1C-1040-4CFF-89B6-07E5FFE3E2FA}"/>
               </a:ext>
             </a:extLst>
           </p:cNvPr>
@@ -13296,7 +14003,7 @@
           <p:cNvPr id="4" name="Date Placeholder 3">
             <a:extLst>
               <a:ext uri="{FF2B5EF4-FFF2-40B4-BE49-F238E27FC236}">
-                <a16:creationId xmlns="" xmlns:a16="http://schemas.microsoft.com/office/drawing/2014/main" id="{0FADEBAF-919B-481E-ABE7-BF7CFF5DB2F2}"/>
+                <a16:creationId xmlns:a16="http://schemas.microsoft.com/office/drawing/2014/main" id="{0FADEBAF-919B-481E-ABE7-BF7CFF5DB2F2}"/>
               </a:ext>
             </a:extLst>
           </p:cNvPr>
@@ -13328,7 +14035,7 @@
           <p:cNvPr id="5" name="Footer Placeholder 4">
             <a:extLst>
               <a:ext uri="{FF2B5EF4-FFF2-40B4-BE49-F238E27FC236}">
-                <a16:creationId xmlns="" xmlns:a16="http://schemas.microsoft.com/office/drawing/2014/main" id="{E289092B-F4D7-4F56-85DC-0A8F9799A49D}"/>
+                <a16:creationId xmlns:a16="http://schemas.microsoft.com/office/drawing/2014/main" id="{E289092B-F4D7-4F56-85DC-0A8F9799A49D}"/>
               </a:ext>
             </a:extLst>
           </p:cNvPr>
@@ -13360,7 +14067,7 @@
           <p:cNvPr id="6" name="Slide Number Placeholder 5">
             <a:extLst>
               <a:ext uri="{FF2B5EF4-FFF2-40B4-BE49-F238E27FC236}">
-                <a16:creationId xmlns="" xmlns:a16="http://schemas.microsoft.com/office/drawing/2014/main" id="{95DBD8B7-2D2E-4B68-BBA0-7A2C655E9B6B}"/>
+                <a16:creationId xmlns:a16="http://schemas.microsoft.com/office/drawing/2014/main" id="{95DBD8B7-2D2E-4B68-BBA0-7A2C655E9B6B}"/>
               </a:ext>
             </a:extLst>
           </p:cNvPr>
@@ -13449,7 +14156,7 @@
           <p:cNvPr id="2" name="Title 1">
             <a:extLst>
               <a:ext uri="{FF2B5EF4-FFF2-40B4-BE49-F238E27FC236}">
-                <a16:creationId xmlns="" xmlns:a16="http://schemas.microsoft.com/office/drawing/2014/main" id="{69C28F10-0443-4FB2-96B3-CA88A9205A7A}"/>
+                <a16:creationId xmlns:a16="http://schemas.microsoft.com/office/drawing/2014/main" id="{69C28F10-0443-4FB2-96B3-CA88A9205A7A}"/>
               </a:ext>
             </a:extLst>
           </p:cNvPr>
@@ -13493,7 +14200,7 @@
           <p:cNvPr id="3" name="Text Placeholder 2">
             <a:extLst>
               <a:ext uri="{FF2B5EF4-FFF2-40B4-BE49-F238E27FC236}">
-                <a16:creationId xmlns="" xmlns:a16="http://schemas.microsoft.com/office/drawing/2014/main" id="{6E740497-4E82-4F03-9592-AE2ECD409DA7}"/>
+                <a16:creationId xmlns:a16="http://schemas.microsoft.com/office/drawing/2014/main" id="{6E740497-4E82-4F03-9592-AE2ECD409DA7}"/>
               </a:ext>
             </a:extLst>
           </p:cNvPr>
@@ -13548,10 +14255,24 @@
                 <a:ea typeface="Times New Roman" panose="02020603050405020304" pitchFamily="18" charset="0"/>
                 <a:cs typeface="Times New Roman" panose="02020603050405020304" pitchFamily="18" charset="0"/>
               </a:rPr>
-              <a:t>&lt;p&gt;Order your copy &lt;</a:t>
+              <a:t>&lt;p&gt;Order your copy </a:t>
+            </a:r>
+            <a:r>
+              <a:rPr lang="en-US" sz="1600" b="1" dirty="0">
+                <a:highlight>
+                  <a:srgbClr val="FFFF00"/>
+                </a:highlight>
+                <a:latin typeface="Courier New" panose="02070309020205020404" pitchFamily="49" charset="0"/>
+                <a:ea typeface="Times New Roman" panose="02020603050405020304" pitchFamily="18" charset="0"/>
+                <a:cs typeface="Times New Roman" panose="02020603050405020304" pitchFamily="18" charset="0"/>
+              </a:rPr>
+              <a:t>&lt;</a:t>
             </a:r>
             <a:r>
               <a:rPr lang="en-US" sz="1600" b="1" dirty="0" err="1">
+                <a:highlight>
+                  <a:srgbClr val="FFFF00"/>
+                </a:highlight>
                 <a:latin typeface="Courier New" panose="02070309020205020404" pitchFamily="49" charset="0"/>
                 <a:ea typeface="Times New Roman" panose="02020603050405020304" pitchFamily="18" charset="0"/>
                 <a:cs typeface="Times New Roman" panose="02020603050405020304" pitchFamily="18" charset="0"/>
@@ -13560,14 +14281,39 @@
             </a:r>
             <a:r>
               <a:rPr lang="en-US" sz="1600" b="1" dirty="0">
-                <a:latin typeface="Courier New" panose="02070309020205020404" pitchFamily="49" charset="0"/>
-                <a:ea typeface="Times New Roman" panose="02020603050405020304" pitchFamily="18" charset="0"/>
-                <a:cs typeface="Times New Roman" panose="02020603050405020304" pitchFamily="18" charset="0"/>
-              </a:rPr>
-              <a:t>&gt;today!&lt;/</a:t>
+                <a:highlight>
+                  <a:srgbClr val="FFFF00"/>
+                </a:highlight>
+                <a:latin typeface="Courier New" panose="02070309020205020404" pitchFamily="49" charset="0"/>
+                <a:ea typeface="Times New Roman" panose="02020603050405020304" pitchFamily="18" charset="0"/>
+                <a:cs typeface="Times New Roman" panose="02020603050405020304" pitchFamily="18" charset="0"/>
+              </a:rPr>
+              <a:t>&gt;</a:t>
+            </a:r>
+            <a:r>
+              <a:rPr lang="en-US" sz="1600" b="1" dirty="0">
+                <a:latin typeface="Courier New" panose="02070309020205020404" pitchFamily="49" charset="0"/>
+                <a:ea typeface="Times New Roman" panose="02020603050405020304" pitchFamily="18" charset="0"/>
+                <a:cs typeface="Times New Roman" panose="02020603050405020304" pitchFamily="18" charset="0"/>
+              </a:rPr>
+              <a:t>today!</a:t>
+            </a:r>
+            <a:r>
+              <a:rPr lang="en-US" sz="1600" b="1" dirty="0">
+                <a:highlight>
+                  <a:srgbClr val="FFFF00"/>
+                </a:highlight>
+                <a:latin typeface="Courier New" panose="02070309020205020404" pitchFamily="49" charset="0"/>
+                <a:ea typeface="Times New Roman" panose="02020603050405020304" pitchFamily="18" charset="0"/>
+                <a:cs typeface="Times New Roman" panose="02020603050405020304" pitchFamily="18" charset="0"/>
+              </a:rPr>
+              <a:t>&lt;/</a:t>
             </a:r>
             <a:r>
               <a:rPr lang="en-US" sz="1600" b="1" dirty="0" err="1">
+                <a:highlight>
+                  <a:srgbClr val="FFFF00"/>
+                </a:highlight>
                 <a:latin typeface="Courier New" panose="02070309020205020404" pitchFamily="49" charset="0"/>
                 <a:ea typeface="Times New Roman" panose="02020603050405020304" pitchFamily="18" charset="0"/>
                 <a:cs typeface="Times New Roman" panose="02020603050405020304" pitchFamily="18" charset="0"/>
@@ -13576,11 +14322,22 @@
             </a:r>
             <a:r>
               <a:rPr lang="en-US" sz="1600" b="1" dirty="0">
-                <a:latin typeface="Courier New" panose="02070309020205020404" pitchFamily="49" charset="0"/>
-                <a:ea typeface="Times New Roman" panose="02020603050405020304" pitchFamily="18" charset="0"/>
-                <a:cs typeface="Times New Roman" panose="02020603050405020304" pitchFamily="18" charset="0"/>
-              </a:rPr>
-              <a:t>&gt;&lt;/p&gt;</a:t>
+                <a:highlight>
+                  <a:srgbClr val="FFFF00"/>
+                </a:highlight>
+                <a:latin typeface="Courier New" panose="02070309020205020404" pitchFamily="49" charset="0"/>
+                <a:ea typeface="Times New Roman" panose="02020603050405020304" pitchFamily="18" charset="0"/>
+                <a:cs typeface="Times New Roman" panose="02020603050405020304" pitchFamily="18" charset="0"/>
+              </a:rPr>
+              <a:t>&gt;</a:t>
+            </a:r>
+            <a:r>
+              <a:rPr lang="en-US" sz="1600" b="1" dirty="0">
+                <a:latin typeface="Courier New" panose="02070309020205020404" pitchFamily="49" charset="0"/>
+                <a:ea typeface="Times New Roman" panose="02020603050405020304" pitchFamily="18" charset="0"/>
+                <a:cs typeface="Times New Roman" panose="02020603050405020304" pitchFamily="18" charset="0"/>
+              </a:rPr>
+              <a:t>&lt;/p&gt;</a:t>
             </a:r>
           </a:p>
           <a:p>
@@ -13623,10 +14380,24 @@
                 <a:ea typeface="Times New Roman" panose="02020603050405020304" pitchFamily="18" charset="0"/>
                 <a:cs typeface="Times New Roman" panose="02020603050405020304" pitchFamily="18" charset="0"/>
               </a:rPr>
-              <a:t>&lt;p&gt;Order your copy &lt;</a:t>
+              <a:t>&lt;p&gt;Order your copy </a:t>
+            </a:r>
+            <a:r>
+              <a:rPr lang="en-US" sz="1600" b="1" dirty="0">
+                <a:highlight>
+                  <a:srgbClr val="FFFF00"/>
+                </a:highlight>
+                <a:latin typeface="Courier New" panose="02070309020205020404" pitchFamily="49" charset="0"/>
+                <a:ea typeface="Times New Roman" panose="02020603050405020304" pitchFamily="18" charset="0"/>
+                <a:cs typeface="Times New Roman" panose="02020603050405020304" pitchFamily="18" charset="0"/>
+              </a:rPr>
+              <a:t>&lt;</a:t>
             </a:r>
             <a:r>
               <a:rPr lang="en-US" sz="1600" b="1" dirty="0" err="1">
+                <a:highlight>
+                  <a:srgbClr val="FFFF00"/>
+                </a:highlight>
                 <a:latin typeface="Courier New" panose="02070309020205020404" pitchFamily="49" charset="0"/>
                 <a:ea typeface="Times New Roman" panose="02020603050405020304" pitchFamily="18" charset="0"/>
                 <a:cs typeface="Times New Roman" panose="02020603050405020304" pitchFamily="18" charset="0"/>
@@ -13635,14 +14406,39 @@
             </a:r>
             <a:r>
               <a:rPr lang="en-US" sz="1600" b="1" dirty="0">
-                <a:latin typeface="Courier New" panose="02070309020205020404" pitchFamily="49" charset="0"/>
-                <a:ea typeface="Times New Roman" panose="02020603050405020304" pitchFamily="18" charset="0"/>
-                <a:cs typeface="Times New Roman" panose="02020603050405020304" pitchFamily="18" charset="0"/>
-              </a:rPr>
-              <a:t>&gt;today!&lt;/p&gt;&lt;/</a:t>
+                <a:highlight>
+                  <a:srgbClr val="FFFF00"/>
+                </a:highlight>
+                <a:latin typeface="Courier New" panose="02070309020205020404" pitchFamily="49" charset="0"/>
+                <a:ea typeface="Times New Roman" panose="02020603050405020304" pitchFamily="18" charset="0"/>
+                <a:cs typeface="Times New Roman" panose="02020603050405020304" pitchFamily="18" charset="0"/>
+              </a:rPr>
+              <a:t>&gt;</a:t>
+            </a:r>
+            <a:r>
+              <a:rPr lang="en-US" sz="1600" b="1" dirty="0">
+                <a:latin typeface="Courier New" panose="02070309020205020404" pitchFamily="49" charset="0"/>
+                <a:ea typeface="Times New Roman" panose="02020603050405020304" pitchFamily="18" charset="0"/>
+                <a:cs typeface="Times New Roman" panose="02020603050405020304" pitchFamily="18" charset="0"/>
+              </a:rPr>
+              <a:t>today!&lt;/p&gt;</a:t>
+            </a:r>
+            <a:r>
+              <a:rPr lang="en-US" sz="1600" b="1" dirty="0">
+                <a:highlight>
+                  <a:srgbClr val="FFFF00"/>
+                </a:highlight>
+                <a:latin typeface="Courier New" panose="02070309020205020404" pitchFamily="49" charset="0"/>
+                <a:ea typeface="Times New Roman" panose="02020603050405020304" pitchFamily="18" charset="0"/>
+                <a:cs typeface="Times New Roman" panose="02020603050405020304" pitchFamily="18" charset="0"/>
+              </a:rPr>
+              <a:t>&lt;/</a:t>
             </a:r>
             <a:r>
               <a:rPr lang="en-US" sz="1600" b="1" dirty="0" err="1">
+                <a:highlight>
+                  <a:srgbClr val="FFFF00"/>
+                </a:highlight>
                 <a:latin typeface="Courier New" panose="02070309020205020404" pitchFamily="49" charset="0"/>
                 <a:ea typeface="Times New Roman" panose="02020603050405020304" pitchFamily="18" charset="0"/>
                 <a:cs typeface="Times New Roman" panose="02020603050405020304" pitchFamily="18" charset="0"/>
@@ -13651,6 +14447,9 @@
             </a:r>
             <a:r>
               <a:rPr lang="en-US" sz="1600" b="1" dirty="0">
+                <a:highlight>
+                  <a:srgbClr val="FFFF00"/>
+                </a:highlight>
                 <a:latin typeface="Courier New" panose="02070309020205020404" pitchFamily="49" charset="0"/>
                 <a:ea typeface="Times New Roman" panose="02020603050405020304" pitchFamily="18" charset="0"/>
                 <a:cs typeface="Times New Roman" panose="02020603050405020304" pitchFamily="18" charset="0"/>
@@ -13668,7 +14467,7 @@
           <p:cNvPr id="4" name="Date Placeholder 3">
             <a:extLst>
               <a:ext uri="{FF2B5EF4-FFF2-40B4-BE49-F238E27FC236}">
-                <a16:creationId xmlns="" xmlns:a16="http://schemas.microsoft.com/office/drawing/2014/main" id="{AA1956B8-0D2B-4078-BEEF-9AD73CBDCAD0}"/>
+                <a16:creationId xmlns:a16="http://schemas.microsoft.com/office/drawing/2014/main" id="{AA1956B8-0D2B-4078-BEEF-9AD73CBDCAD0}"/>
               </a:ext>
             </a:extLst>
           </p:cNvPr>
@@ -13700,7 +14499,7 @@
           <p:cNvPr id="5" name="Footer Placeholder 4">
             <a:extLst>
               <a:ext uri="{FF2B5EF4-FFF2-40B4-BE49-F238E27FC236}">
-                <a16:creationId xmlns="" xmlns:a16="http://schemas.microsoft.com/office/drawing/2014/main" id="{489AFCDE-BCA2-4326-989E-BB8FAAF5CEF0}"/>
+                <a16:creationId xmlns:a16="http://schemas.microsoft.com/office/drawing/2014/main" id="{489AFCDE-BCA2-4326-989E-BB8FAAF5CEF0}"/>
               </a:ext>
             </a:extLst>
           </p:cNvPr>
@@ -13732,7 +14531,7 @@
           <p:cNvPr id="6" name="Slide Number Placeholder 5">
             <a:extLst>
               <a:ext uri="{FF2B5EF4-FFF2-40B4-BE49-F238E27FC236}">
-                <a16:creationId xmlns="" xmlns:a16="http://schemas.microsoft.com/office/drawing/2014/main" id="{385CF689-F647-4AF9-B695-BE1BCDD176AA}"/>
+                <a16:creationId xmlns:a16="http://schemas.microsoft.com/office/drawing/2014/main" id="{385CF689-F647-4AF9-B695-BE1BCDD176AA}"/>
               </a:ext>
             </a:extLst>
           </p:cNvPr>
@@ -13821,7 +14620,7 @@
           <p:cNvPr id="2" name="Title 1">
             <a:extLst>
               <a:ext uri="{FF2B5EF4-FFF2-40B4-BE49-F238E27FC236}">
-                <a16:creationId xmlns="" xmlns:a16="http://schemas.microsoft.com/office/drawing/2014/main" id="{8613B990-AF6E-4A0C-BB9C-082A5276476E}"/>
+                <a16:creationId xmlns:a16="http://schemas.microsoft.com/office/drawing/2014/main" id="{8613B990-AF6E-4A0C-BB9C-082A5276476E}"/>
               </a:ext>
             </a:extLst>
           </p:cNvPr>
@@ -13865,7 +14664,7 @@
           <p:cNvPr id="3" name="Text Placeholder 2">
             <a:extLst>
               <a:ext uri="{FF2B5EF4-FFF2-40B4-BE49-F238E27FC236}">
-                <a16:creationId xmlns="" xmlns:a16="http://schemas.microsoft.com/office/drawing/2014/main" id="{2BFEA6C3-5F87-4388-B8CA-3E89E152DCCD}"/>
+                <a16:creationId xmlns:a16="http://schemas.microsoft.com/office/drawing/2014/main" id="{2BFEA6C3-5F87-4388-B8CA-3E89E152DCCD}"/>
               </a:ext>
             </a:extLst>
           </p:cNvPr>
@@ -13995,15 +14794,7 @@
                 <a:ea typeface="Times New Roman" panose="02020603050405020304" pitchFamily="18" charset="0"/>
                 <a:cs typeface="Times New Roman" panose="02020603050405020304" pitchFamily="18" charset="0"/>
               </a:rPr>
-              <a:t>="contact.html" title="Click to Contact </a:t>
-            </a:r>
-            <a:r>
-              <a:rPr lang="en-US" sz="1600" b="1" dirty="0" smtClean="0">
-                <a:latin typeface="Courier New" panose="02070309020205020404" pitchFamily="49" charset="0"/>
-                <a:ea typeface="Times New Roman" panose="02020603050405020304" pitchFamily="18" charset="0"/>
-                <a:cs typeface="Times New Roman" panose="02020603050405020304" pitchFamily="18" charset="0"/>
-              </a:rPr>
-              <a:t>Us“</a:t>
+              <a:t>="contact.html" title="Click to Contact Us“</a:t>
             </a:r>
           </a:p>
           <a:p>
@@ -14024,23 +14815,15 @@
                 <a:ea typeface="Times New Roman" panose="02020603050405020304" pitchFamily="18" charset="0"/>
                 <a:cs typeface="Times New Roman" panose="02020603050405020304" pitchFamily="18" charset="0"/>
               </a:rPr>
-              <a:t> </a:t>
-            </a:r>
-            <a:r>
-              <a:rPr lang="en-US" sz="1600" b="1" dirty="0" smtClean="0">
-                <a:latin typeface="Courier New" panose="02070309020205020404" pitchFamily="49" charset="0"/>
-                <a:ea typeface="Times New Roman" panose="02020603050405020304" pitchFamily="18" charset="0"/>
-                <a:cs typeface="Times New Roman" panose="02020603050405020304" pitchFamily="18" charset="0"/>
-              </a:rPr>
-              <a:t> </a:t>
-            </a:r>
-            <a:r>
-              <a:rPr lang="en-US" sz="1600" b="1" dirty="0" smtClean="0">
-                <a:latin typeface="Courier New" panose="02070309020205020404" pitchFamily="49" charset="0"/>
-                <a:ea typeface="Times New Roman" panose="02020603050405020304" pitchFamily="18" charset="0"/>
-                <a:cs typeface="Times New Roman" panose="02020603050405020304" pitchFamily="18" charset="0"/>
-              </a:rPr>
-              <a:t> </a:t>
+              <a:t>   class="</a:t>
+            </a:r>
+            <a:r>
+              <a:rPr lang="en-US" sz="1600" b="1" dirty="0" err="1">
+                <a:latin typeface="Courier New" panose="02070309020205020404" pitchFamily="49" charset="0"/>
+                <a:ea typeface="Times New Roman" panose="02020603050405020304" pitchFamily="18" charset="0"/>
+                <a:cs typeface="Times New Roman" panose="02020603050405020304" pitchFamily="18" charset="0"/>
+              </a:rPr>
+              <a:t>nav_link</a:t>
             </a:r>
             <a:r>
               <a:rPr lang="en-US" sz="1600" b="1" dirty="0">
@@ -14048,28 +14831,29 @@
                 <a:ea typeface="Times New Roman" panose="02020603050405020304" pitchFamily="18" charset="0"/>
                 <a:cs typeface="Times New Roman" panose="02020603050405020304" pitchFamily="18" charset="0"/>
               </a:rPr>
-              <a:t>class="</a:t>
-            </a:r>
-            <a:r>
-              <a:rPr lang="en-US" sz="1600" b="1" dirty="0" err="1">
-                <a:latin typeface="Courier New" panose="02070309020205020404" pitchFamily="49" charset="0"/>
-                <a:ea typeface="Times New Roman" panose="02020603050405020304" pitchFamily="18" charset="0"/>
-                <a:cs typeface="Times New Roman" panose="02020603050405020304" pitchFamily="18" charset="0"/>
-              </a:rPr>
-              <a:t>nav_link</a:t>
-            </a:r>
-            <a:r>
-              <a:rPr lang="en-US" sz="1600" b="1" dirty="0">
-                <a:latin typeface="Courier New" panose="02070309020205020404" pitchFamily="49" charset="0"/>
-                <a:ea typeface="Times New Roman" panose="02020603050405020304" pitchFamily="18" charset="0"/>
-                <a:cs typeface="Times New Roman" panose="02020603050405020304" pitchFamily="18" charset="0"/>
-              </a:rPr>
               <a:t>"&gt;</a:t>
             </a:r>
           </a:p>
           <a:p>
             <a:endParaRPr lang="en-US" dirty="0"/>
           </a:p>
+          <a:p>
+            <a:endParaRPr lang="en-US" b="1" i="1" dirty="0">
+              <a:solidFill>
+                <a:schemeClr val="bg2"/>
+              </a:solidFill>
+            </a:endParaRPr>
+          </a:p>
+          <a:p>
+            <a:r>
+              <a:rPr lang="en-US" b="1" i="1" dirty="0">
+                <a:solidFill>
+                  <a:schemeClr val="bg2"/>
+                </a:solidFill>
+              </a:rPr>
+              <a:t>Note: Closing tags never contain attributes.</a:t>
+            </a:r>
+          </a:p>
         </p:txBody>
       </p:sp>
       <p:sp>
@@ -14077,7 +14861,7 @@
           <p:cNvPr id="4" name="Date Placeholder 3">
             <a:extLst>
               <a:ext uri="{FF2B5EF4-FFF2-40B4-BE49-F238E27FC236}">
-                <a16:creationId xmlns="" xmlns:a16="http://schemas.microsoft.com/office/drawing/2014/main" id="{C563064C-571A-4BBE-A90B-71D474F5CDCC}"/>
+                <a16:creationId xmlns:a16="http://schemas.microsoft.com/office/drawing/2014/main" id="{C563064C-571A-4BBE-A90B-71D474F5CDCC}"/>
               </a:ext>
             </a:extLst>
           </p:cNvPr>
@@ -14109,7 +14893,7 @@
           <p:cNvPr id="5" name="Footer Placeholder 4">
             <a:extLst>
               <a:ext uri="{FF2B5EF4-FFF2-40B4-BE49-F238E27FC236}">
-                <a16:creationId xmlns="" xmlns:a16="http://schemas.microsoft.com/office/drawing/2014/main" id="{A141305C-AA0C-4BF2-BDDA-AD1C2201205E}"/>
+                <a16:creationId xmlns:a16="http://schemas.microsoft.com/office/drawing/2014/main" id="{A141305C-AA0C-4BF2-BDDA-AD1C2201205E}"/>
               </a:ext>
             </a:extLst>
           </p:cNvPr>
@@ -14141,7 +14925,7 @@
           <p:cNvPr id="6" name="Slide Number Placeholder 5">
             <a:extLst>
               <a:ext uri="{FF2B5EF4-FFF2-40B4-BE49-F238E27FC236}">
-                <a16:creationId xmlns="" xmlns:a16="http://schemas.microsoft.com/office/drawing/2014/main" id="{7A09F778-C183-47F3-929D-4816B10DCA8B}"/>
+                <a16:creationId xmlns:a16="http://schemas.microsoft.com/office/drawing/2014/main" id="{7A09F778-C183-47F3-929D-4816B10DCA8B}"/>
               </a:ext>
             </a:extLst>
           </p:cNvPr>
@@ -14230,7 +15014,7 @@
           <p:cNvPr id="2" name="Title 1">
             <a:extLst>
               <a:ext uri="{FF2B5EF4-FFF2-40B4-BE49-F238E27FC236}">
-                <a16:creationId xmlns="" xmlns:a16="http://schemas.microsoft.com/office/drawing/2014/main" id="{E58ED8C8-1665-401E-9031-FD2C2A6EED6D}"/>
+                <a16:creationId xmlns:a16="http://schemas.microsoft.com/office/drawing/2014/main" id="{E58ED8C8-1665-401E-9031-FD2C2A6EED6D}"/>
               </a:ext>
             </a:extLst>
           </p:cNvPr>
@@ -14274,7 +15058,7 @@
           <p:cNvPr id="3" name="Text Placeholder 2">
             <a:extLst>
               <a:ext uri="{FF2B5EF4-FFF2-40B4-BE49-F238E27FC236}">
-                <a16:creationId xmlns="" xmlns:a16="http://schemas.microsoft.com/office/drawing/2014/main" id="{C7913E57-A2C7-4106-8064-8889F824DB08}"/>
+                <a16:creationId xmlns:a16="http://schemas.microsoft.com/office/drawing/2014/main" id="{C7913E57-A2C7-4106-8064-8889F824DB08}"/>
               </a:ext>
             </a:extLst>
           </p:cNvPr>
@@ -14352,7 +15136,7 @@
           <p:cNvPr id="4" name="Date Placeholder 3">
             <a:extLst>
               <a:ext uri="{FF2B5EF4-FFF2-40B4-BE49-F238E27FC236}">
-                <a16:creationId xmlns="" xmlns:a16="http://schemas.microsoft.com/office/drawing/2014/main" id="{3B98CC6C-7636-406E-8FF6-C1541666DF3E}"/>
+                <a16:creationId xmlns:a16="http://schemas.microsoft.com/office/drawing/2014/main" id="{3B98CC6C-7636-406E-8FF6-C1541666DF3E}"/>
               </a:ext>
             </a:extLst>
           </p:cNvPr>
@@ -14384,7 +15168,7 @@
           <p:cNvPr id="5" name="Footer Placeholder 4">
             <a:extLst>
               <a:ext uri="{FF2B5EF4-FFF2-40B4-BE49-F238E27FC236}">
-                <a16:creationId xmlns="" xmlns:a16="http://schemas.microsoft.com/office/drawing/2014/main" id="{7E2F04B6-C077-403B-91C5-7A935AE8F4ED}"/>
+                <a16:creationId xmlns:a16="http://schemas.microsoft.com/office/drawing/2014/main" id="{7E2F04B6-C077-403B-91C5-7A935AE8F4ED}"/>
               </a:ext>
             </a:extLst>
           </p:cNvPr>
@@ -14416,7 +15200,7 @@
           <p:cNvPr id="6" name="Slide Number Placeholder 5">
             <a:extLst>
               <a:ext uri="{FF2B5EF4-FFF2-40B4-BE49-F238E27FC236}">
-                <a16:creationId xmlns="" xmlns:a16="http://schemas.microsoft.com/office/drawing/2014/main" id="{2833B3E0-7EE5-423F-BCFF-FF305B78F561}"/>
+                <a16:creationId xmlns:a16="http://schemas.microsoft.com/office/drawing/2014/main" id="{2833B3E0-7EE5-423F-BCFF-FF305B78F561}"/>
               </a:ext>
             </a:extLst>
           </p:cNvPr>

</xml_diff>